<commit_message>
upgrade add_country for subtitles
</commit_message>
<xml_diff>
--- a/powerpoints/test.pptx
+++ b/powerpoints/test.pptx
@@ -2276,14 +2276,174 @@
             <p:ph type="title"/>
           </p:nvPr>
         </p:nvSpPr>
-        <p:spPr/>
+        <p:spPr>
+          <a:xfrm>
+            <a:off x="138545" y="100000"/>
+            <a:ext cx="6557819" cy="789871"/>
+          </a:xfrm>
+        </p:spPr>
         <p:txBody>
           <a:bodyPr/>
           <a:lstStyle/>
           <a:p>
             <a:r>
-              <a:rPr lang="fr-CA" dirty="0"/>
-              <a:t>banner</a:t>
+              <a:t>France</a:t>
+            </a:r>
+          </a:p>
+        </p:txBody>
+      </p:sp>
+      <p:sp>
+        <p:nvSpPr>
+          <p:cNvPr id="3" name="TextBox 2"/>
+          <p:cNvSpPr txBox="1"/>
+          <p:nvPr/>
+        </p:nvSpPr>
+        <p:spPr>
+          <a:xfrm>
+            <a:off x="0" y="1039871"/>
+            <a:ext cx="6858000" cy="365760"/>
+          </a:xfrm>
+          <a:prstGeom prst="rect">
+            <a:avLst/>
+          </a:prstGeom>
+          <a:noFill/>
+        </p:spPr>
+        <p:txBody>
+          <a:bodyPr wrap="none">
+            <a:spAutoFit/>
+          </a:bodyPr>
+          <a:lstStyle/>
+          <a:p>
+            <a:pPr>
+              <a:defRPr sz="1000"/>
+            </a:pPr>
+            <a:r>
+              <a:t>Introduction</a:t>
+            </a:r>
+          </a:p>
+        </p:txBody>
+      </p:sp>
+      <p:sp>
+        <p:nvSpPr>
+          <p:cNvPr id="4" name="TextBox 3"/>
+          <p:cNvSpPr txBox="1"/>
+          <p:nvPr/>
+        </p:nvSpPr>
+        <p:spPr>
+          <a:xfrm>
+            <a:off x="0" y="1405631"/>
+            <a:ext cx="6858000" cy="823325"/>
+          </a:xfrm>
+          <a:prstGeom prst="rect">
+            <a:avLst/>
+          </a:prstGeom>
+          <a:noFill/>
+        </p:spPr>
+        <p:txBody>
+          <a:bodyPr wrap="none">
+            <a:spAutoFit/>
+          </a:bodyPr>
+          <a:lstStyle/>
+          <a:p>
+            <a:pPr>
+              <a:defRPr sz="1000"/>
+            </a:pPr>
+            <a:r>
+              <a:t>La France est un beau pays!La France est un beau pays!La France est un beau pays!La France est un</a:t>
+            </a:r>
+            <a:br/>
+            <a:r>
+              <a:t>beau pays!La France est un beau pays!La France est un beau pays!La France est un beau pays!La</a:t>
+            </a:r>
+            <a:br/>
+            <a:r>
+              <a:t>France est un beau pays!La France est un beau pays!La France est un beau pays!La France est un</a:t>
+            </a:r>
+            <a:br/>
+            <a:r>
+              <a:t>beau pays!La France est un beau pays!La France est un beau pays!La France est un beau pays!</a:t>
+            </a:r>
+          </a:p>
+        </p:txBody>
+      </p:sp>
+      <p:sp>
+        <p:nvSpPr>
+          <p:cNvPr id="5" name="TextBox 4"/>
+          <p:cNvSpPr txBox="1"/>
+          <p:nvPr/>
+        </p:nvSpPr>
+        <p:spPr>
+          <a:xfrm>
+            <a:off x="0" y="2228956"/>
+            <a:ext cx="6858000" cy="365760"/>
+          </a:xfrm>
+          <a:prstGeom prst="rect">
+            <a:avLst/>
+          </a:prstGeom>
+          <a:noFill/>
+        </p:spPr>
+        <p:txBody>
+          <a:bodyPr wrap="none">
+            <a:spAutoFit/>
+          </a:bodyPr>
+          <a:lstStyle/>
+          <a:p>
+            <a:pPr>
+              <a:defRPr sz="1000"/>
+            </a:pPr>
+            <a:r>
+              <a:t>Description</a:t>
+            </a:r>
+          </a:p>
+        </p:txBody>
+      </p:sp>
+      <p:sp>
+        <p:nvSpPr>
+          <p:cNvPr id="6" name="TextBox 5"/>
+          <p:cNvSpPr txBox="1"/>
+          <p:nvPr/>
+        </p:nvSpPr>
+        <p:spPr>
+          <a:xfrm>
+            <a:off x="0" y="2594716"/>
+            <a:ext cx="6858000" cy="1030711"/>
+          </a:xfrm>
+          <a:prstGeom prst="rect">
+            <a:avLst/>
+          </a:prstGeom>
+          <a:noFill/>
+        </p:spPr>
+        <p:txBody>
+          <a:bodyPr wrap="none">
+            <a:spAutoFit/>
+          </a:bodyPr>
+          <a:lstStyle/>
+          <a:p>
+            <a:pPr>
+              <a:defRPr sz="1000"/>
+            </a:pPr>
+            <a:r>
+              <a:t>La France est vraiment un super beau pays!La France est vraiment un super beau pays!La France est</a:t>
+            </a:r>
+            <a:br/>
+            <a:r>
+              <a:t>vraiment un super beau pays!La France est vraiment un super beau pays!La France est vraiment un</a:t>
+            </a:r>
+            <a:br/>
+            <a:r>
+              <a:t>super beau pays!La France est vraiment un super beau pays!La France est vraiment un super beau</a:t>
+            </a:r>
+            <a:br/>
+            <a:r>
+              <a:t>pays!La France est vraiment un super beau pays!La France est vraiment un super beau pays!La</a:t>
+            </a:r>
+            <a:br/>
+            <a:r>
+              <a:t>France est vraiment un super beau pays!La France est vraiment un super beau pays!La France est</a:t>
+            </a:r>
+            <a:br/>
+            <a:r>
+              <a:t>vraiment un super beau pays!</a:t>
             </a:r>
           </a:p>
         </p:txBody>
@@ -2306,7 +2466,7 @@
         </p:nvSpPr>
         <p:spPr>
           <a:xfrm>
-            <a:off x="138545" y="1376709"/>
+            <a:off x="138545" y="3725427"/>
             <a:ext cx="6557819" cy="789871"/>
           </a:xfrm>
         </p:spPr>
@@ -2315,22 +2475,21 @@
           <a:lstStyle/>
           <a:p>
             <a:r>
-              <a:rPr lang="fr-CA" dirty="0"/>
-              <a:t>banner</a:t>
-            </a:r>
-          </a:p>
-        </p:txBody>
-      </p:sp>
-      <p:sp>
-        <p:nvSpPr>
-          <p:cNvPr id="3" name="TextBox 2"/>
+              <a:t>Allemagne</a:t>
+            </a:r>
+          </a:p>
+        </p:txBody>
+      </p:sp>
+      <p:sp>
+        <p:nvSpPr>
+          <p:cNvPr id="7" name="TextBox 6"/>
           <p:cNvSpPr txBox="1"/>
           <p:nvPr/>
         </p:nvSpPr>
         <p:spPr>
           <a:xfrm>
-            <a:off x="0" y="2316580"/>
-            <a:ext cx="6858000" cy="1011326"/>
+            <a:off x="0" y="4665298"/>
+            <a:ext cx="6858000" cy="365760"/>
           </a:xfrm>
           <a:prstGeom prst="rect">
             <a:avLst/>
@@ -2342,134 +2501,8 @@
             <a:spAutoFit/>
           </a:bodyPr>
           <a:lstStyle/>
-          <a:p/>
-          <a:p>
-            <a:pPr algn="ctr">
-              <a:defRPr sz="1000"/>
-            </a:pPr>
-            <a:r>
-              <a:t>La France est un beau pays!La France est un beau pays!La France est un beau pays!La France est un</a:t>
-            </a:r>
-            <a:br/>
-            <a:r>
-              <a:t>beau pays!La France est un beau pays!La France est un beau pays!La France est un beau pays!La</a:t>
-            </a:r>
-            <a:br/>
-            <a:r>
-              <a:t>France est un beau pays!La France est un beau pays!La France est un beau pays!</a:t>
-            </a:r>
-          </a:p>
-        </p:txBody>
-      </p:sp>
-      <p:sp>
-        <p:nvSpPr>
-          <p:cNvPr id="4" name="TextBox 3"/>
-          <p:cNvSpPr txBox="1"/>
-          <p:nvPr/>
-        </p:nvSpPr>
-        <p:spPr>
-          <a:xfrm>
-            <a:off x="0" y="3477906"/>
-            <a:ext cx="6858000" cy="1396471"/>
-          </a:xfrm>
-          <a:prstGeom prst="rect">
-            <a:avLst/>
-          </a:prstGeom>
-          <a:noFill/>
-        </p:spPr>
-        <p:txBody>
-          <a:bodyPr wrap="none">
-            <a:spAutoFit/>
-          </a:bodyPr>
-          <a:lstStyle/>
-          <a:p/>
-          <a:p>
-            <a:pPr algn="ctr">
-              <a:defRPr sz="1000"/>
-            </a:pPr>
-            <a:r>
-              <a:t>La France est vraiment un super beau pays!La France est vraiment un super beau pays!La France est</a:t>
-            </a:r>
-            <a:br/>
-            <a:r>
-              <a:t>vraiment un super beau pays!La France est vraiment un super beau pays!La France est vraiment un</a:t>
-            </a:r>
-            <a:br/>
-            <a:r>
-              <a:t>super beau pays!La France est vraiment un super beau pays!La France est vraiment un super beau</a:t>
-            </a:r>
-            <a:br/>
-            <a:r>
-              <a:t>pays!La France est vraiment un super beau pays!La France est vraiment un super beau pays!La</a:t>
-            </a:r>
-            <a:br/>
-            <a:r>
-              <a:t>France est vraiment un super beau pays!La France est vraiment un super beau pays!La France est</a:t>
-            </a:r>
-            <a:br/>
-            <a:r>
-              <a:t>vraiment un super beau pays!</a:t>
-            </a:r>
-          </a:p>
-        </p:txBody>
-      </p:sp>
-      <p:sp>
-        <p:nvSpPr>
-          <p:cNvPr id="2" name="Titre 1">
-            <a:extLst>
-              <a:ext uri="{FF2B5EF4-FFF2-40B4-BE49-F238E27FC236}">
-                <a16:creationId xmlns:a16="http://schemas.microsoft.com/office/drawing/2014/main" id="{486D4E87-2BC6-989D-C31B-C94C23654F8A}"/>
-              </a:ext>
-            </a:extLst>
-          </p:cNvPr>
-          <p:cNvSpPr>
-            <a:spLocks noGrp="1"/>
-          </p:cNvSpPr>
-          <p:nvPr>
-            <p:ph type="title"/>
-          </p:nvPr>
-        </p:nvSpPr>
-        <p:spPr>
-          <a:xfrm>
-            <a:off x="138545" y="4974377"/>
-            <a:ext cx="6557819" cy="789871"/>
-          </a:xfrm>
-        </p:spPr>
-        <p:txBody>
-          <a:bodyPr/>
-          <a:lstStyle/>
-          <a:p>
-            <a:r>
-              <a:rPr lang="fr-CA" dirty="0"/>
-              <a:t>banner</a:t>
-            </a:r>
-          </a:p>
-        </p:txBody>
-      </p:sp>
-      <p:sp>
-        <p:nvSpPr>
-          <p:cNvPr id="5" name="TextBox 4"/>
-          <p:cNvSpPr txBox="1"/>
-          <p:nvPr/>
-        </p:nvSpPr>
-        <p:spPr>
-          <a:xfrm>
-            <a:off x="0" y="5914248"/>
-            <a:ext cx="6858000" cy="731520"/>
-          </a:xfrm>
-          <a:prstGeom prst="rect">
-            <a:avLst/>
-          </a:prstGeom>
-          <a:noFill/>
-        </p:spPr>
-        <p:txBody>
-          <a:bodyPr wrap="none">
-            <a:spAutoFit/>
-          </a:bodyPr>
-          <a:lstStyle/>
-          <a:p/>
-          <a:p>
-            <a:pPr algn="ctr">
+          <a:p>
+            <a:pPr>
               <a:defRPr sz="1000"/>
             </a:pPr>
             <a:r>

</xml_diff>

<commit_message>
add_countries with same color style
</commit_message>
<xml_diff>
--- a/powerpoints/test.pptx
+++ b/powerpoints/test.pptx
@@ -7,7 +7,6 @@
   <p:sldIdLst>
     <p:sldId id="259" r:id="rId5"/>
     <p:sldId id="260" r:id="rId6"/>
-    <p:sldId id="261" r:id="rId11"/>
   </p:sldIdLst>
   <p:sldSz cx="6858000" cy="9144000" type="letter"/>
   <p:notesSz cx="6858000" cy="9144000"/>
@@ -2340,14 +2339,21 @@
         </p:nvSpPr>
         <p:spPr>
           <a:xfrm>
-            <a:off x="138545" y="250000"/>
-            <a:ext cx="6557819" cy="789871"/>
+            <a:off x="138545" y="115000"/>
+            <a:ext cx="6557819" cy="400000"/>
           </a:xfrm>
         </p:spPr>
         <p:txBody>
           <a:bodyPr/>
           <a:lstStyle/>
           <a:p>
+            <a:pPr>
+              <a:defRPr b="1" i="1">
+                <a:solidFill>
+                  <a:schemeClr val="bg1"/>
+                </a:solidFill>
+              </a:defRPr>
+            </a:pPr>
             <a:r>
               <a:t>France</a:t>
             </a:r>
@@ -2362,7 +2368,7 @@
         </p:nvSpPr>
         <p:spPr>
           <a:xfrm>
-            <a:off x="0" y="1189871"/>
+            <a:off x="0" y="530000"/>
             <a:ext cx="6858000" cy="365760"/>
           </a:xfrm>
           <a:prstGeom prst="rect">
@@ -2397,7 +2403,7 @@
         </p:nvSpPr>
         <p:spPr>
           <a:xfrm>
-            <a:off x="0" y="1555631"/>
+            <a:off x="0" y="895760"/>
             <a:ext cx="6858000" cy="846368"/>
           </a:xfrm>
           <a:prstGeom prst="rect">
@@ -2441,7 +2447,7 @@
         </p:nvSpPr>
         <p:spPr>
           <a:xfrm>
-            <a:off x="0" y="2401999"/>
+            <a:off x="0" y="1742128"/>
             <a:ext cx="6858000" cy="365760"/>
           </a:xfrm>
           <a:prstGeom prst="rect">
@@ -2476,7 +2482,7 @@
         </p:nvSpPr>
         <p:spPr>
           <a:xfrm>
-            <a:off x="0" y="2767759"/>
+            <a:off x="0" y="2107888"/>
             <a:ext cx="6858000" cy="1050462"/>
           </a:xfrm>
           <a:prstGeom prst="rect">
@@ -2537,14 +2543,21 @@
         </p:nvSpPr>
         <p:spPr>
           <a:xfrm>
-            <a:off x="138545" y="3968221"/>
-            <a:ext cx="6557819" cy="789871"/>
+            <a:off x="138545" y="3173350"/>
+            <a:ext cx="6557819" cy="400000"/>
           </a:xfrm>
         </p:spPr>
         <p:txBody>
           <a:bodyPr/>
           <a:lstStyle/>
           <a:p>
+            <a:pPr>
+              <a:defRPr b="1" i="1">
+                <a:solidFill>
+                  <a:schemeClr val="bg1"/>
+                </a:solidFill>
+              </a:defRPr>
+            </a:pPr>
             <a:r>
               <a:t>Australie</a:t>
             </a:r>
@@ -2559,7 +2572,7 @@
         </p:nvSpPr>
         <p:spPr>
           <a:xfrm>
-            <a:off x="0" y="4908092"/>
+            <a:off x="0" y="3588350"/>
             <a:ext cx="6858000" cy="892454"/>
           </a:xfrm>
           <a:prstGeom prst="rect">
@@ -2616,14 +2629,21 @@
         </p:nvSpPr>
         <p:spPr>
           <a:xfrm>
-            <a:off x="138545" y="5950546"/>
-            <a:ext cx="6557819" cy="789871"/>
+            <a:off x="138545" y="4495804"/>
+            <a:ext cx="6557819" cy="400000"/>
           </a:xfrm>
         </p:spPr>
         <p:txBody>
           <a:bodyPr/>
           <a:lstStyle/>
           <a:p>
+            <a:pPr>
+              <a:defRPr b="1" i="1">
+                <a:solidFill>
+                  <a:schemeClr val="bg1"/>
+                </a:solidFill>
+              </a:defRPr>
+            </a:pPr>
             <a:r>
               <a:t>Canada</a:t>
             </a:r>
@@ -2638,7 +2658,7 @@
         </p:nvSpPr>
         <p:spPr>
           <a:xfrm>
-            <a:off x="0" y="6890417"/>
+            <a:off x="0" y="4910804"/>
             <a:ext cx="6858000" cy="892454"/>
           </a:xfrm>
           <a:prstGeom prst="rect">
@@ -2695,16 +2715,156 @@
         </p:nvSpPr>
         <p:spPr>
           <a:xfrm>
-            <a:off x="138545" y="7932871"/>
-            <a:ext cx="6557819" cy="789871"/>
+            <a:off x="138545" y="5818258"/>
+            <a:ext cx="6557819" cy="400000"/>
           </a:xfrm>
         </p:spPr>
         <p:txBody>
           <a:bodyPr/>
           <a:lstStyle/>
           <a:p>
+            <a:pPr>
+              <a:defRPr b="1" i="1">
+                <a:solidFill>
+                  <a:schemeClr val="bg1"/>
+                </a:solidFill>
+              </a:defRPr>
+            </a:pPr>
             <a:r>
               <a:t>Kenya</a:t>
+            </a:r>
+          </a:p>
+        </p:txBody>
+      </p:sp>
+      <p:sp>
+        <p:nvSpPr>
+          <p:cNvPr id="9" name="TextBox 8"/>
+          <p:cNvSpPr txBox="1"/>
+          <p:nvPr/>
+        </p:nvSpPr>
+        <p:spPr>
+          <a:xfrm>
+            <a:off x="0" y="6233258"/>
+            <a:ext cx="6858000" cy="892454"/>
+          </a:xfrm>
+          <a:prstGeom prst="rect">
+            <a:avLst/>
+          </a:prstGeom>
+          <a:noFill/>
+        </p:spPr>
+        <p:txBody>
+          <a:bodyPr wrap="none">
+            <a:spAutoFit/>
+          </a:bodyPr>
+          <a:lstStyle/>
+          <a:p>
+            <a:pPr algn="ctr">
+              <a:defRPr sz="1000"/>
+            </a:pPr>
+            <a:r>
+              <a:t>L'allemagne est un beau pays! L'allemagne est un beau pays! L'allemagne est un beau pays!</a:t>
+            </a:r>
+            <a:br/>
+            <a:r>
+              <a:t>L'allemagne est un beau pays! L'allemagne est un beau pays! L'allemagne est un beau pays!</a:t>
+            </a:r>
+            <a:br/>
+            <a:r>
+              <a:t>L'allemagne est un beau pays! L'allemagne est un beau pays! L'allemagne est un beau pays!</a:t>
+            </a:r>
+            <a:br/>
+            <a:r>
+              <a:t>L'allemagne est un beau pays! L'allemagne est un beau pays! L'allemagne est un beau pays!</a:t>
+            </a:r>
+            <a:br/>
+            <a:r>
+              <a:t>L'allemagne est un beau pays! L'allemagne est un beau pays! </a:t>
+            </a:r>
+          </a:p>
+        </p:txBody>
+      </p:sp>
+      <p:sp>
+        <p:nvSpPr>
+          <p:cNvPr id="2" name="Titre 1">
+            <a:extLst>
+              <a:ext uri="{FF2B5EF4-FFF2-40B4-BE49-F238E27FC236}">
+                <a16:creationId xmlns:a16="http://schemas.microsoft.com/office/drawing/2014/main" id="{486D4E87-2BC6-989D-C31B-C94C23654F8A}"/>
+              </a:ext>
+            </a:extLst>
+          </p:cNvPr>
+          <p:cNvSpPr>
+            <a:spLocks noGrp="1"/>
+          </p:cNvSpPr>
+          <p:nvPr>
+            <p:ph type="title"/>
+          </p:nvPr>
+        </p:nvSpPr>
+        <p:spPr>
+          <a:xfrm>
+            <a:off x="138545" y="7140712"/>
+            <a:ext cx="6557819" cy="400000"/>
+          </a:xfrm>
+        </p:spPr>
+        <p:txBody>
+          <a:bodyPr/>
+          <a:lstStyle/>
+          <a:p>
+            <a:pPr>
+              <a:defRPr b="1" i="1">
+                <a:solidFill>
+                  <a:schemeClr val="bg1"/>
+                </a:solidFill>
+              </a:defRPr>
+            </a:pPr>
+            <a:r>
+              <a:t>Belgique</a:t>
+            </a:r>
+          </a:p>
+        </p:txBody>
+      </p:sp>
+      <p:sp>
+        <p:nvSpPr>
+          <p:cNvPr id="10" name="TextBox 9"/>
+          <p:cNvSpPr txBox="1"/>
+          <p:nvPr/>
+        </p:nvSpPr>
+        <p:spPr>
+          <a:xfrm>
+            <a:off x="0" y="7555712"/>
+            <a:ext cx="6858000" cy="892454"/>
+          </a:xfrm>
+          <a:prstGeom prst="rect">
+            <a:avLst/>
+          </a:prstGeom>
+          <a:noFill/>
+        </p:spPr>
+        <p:txBody>
+          <a:bodyPr wrap="none">
+            <a:spAutoFit/>
+          </a:bodyPr>
+          <a:lstStyle/>
+          <a:p>
+            <a:pPr algn="ctr">
+              <a:defRPr sz="1000"/>
+            </a:pPr>
+            <a:r>
+              <a:t>L'allemagne est un beau pays! L'allemagne est un beau pays! L'allemagne est un beau pays!</a:t>
+            </a:r>
+            <a:br/>
+            <a:r>
+              <a:t>L'allemagne est un beau pays! L'allemagne est un beau pays! L'allemagne est un beau pays!</a:t>
+            </a:r>
+            <a:br/>
+            <a:r>
+              <a:t>L'allemagne est un beau pays! L'allemagne est un beau pays! L'allemagne est un beau pays!</a:t>
+            </a:r>
+            <a:br/>
+            <a:r>
+              <a:t>L'allemagne est un beau pays! L'allemagne est un beau pays! L'allemagne est un beau pays!</a:t>
+            </a:r>
+            <a:br/>
+            <a:r>
+              <a:t>L'allemagne est un beau pays! L'allemagne est un beau pays! </a:t>
             </a:r>
           </a:p>
         </p:txBody>
@@ -2715,161 +2875,6 @@
         <p14:creationId xmlns:p14="http://schemas.microsoft.com/office/powerpoint/2010/main" val="2707958192"/>
       </p:ext>
     </p:extLst>
-  </p:cSld>
-  <p:clrMapOvr>
-    <a:masterClrMapping/>
-  </p:clrMapOvr>
-</p:sld>
-</file>
-
-<file path=ppt/slides/slide3.xml><?xml version="1.0" encoding="utf-8"?>
-<p:sld xmlns:a="http://schemas.openxmlformats.org/drawingml/2006/main" xmlns:p="http://schemas.openxmlformats.org/presentationml/2006/main" xmlns:r="http://schemas.openxmlformats.org/officeDocument/2006/relationships">
-  <p:cSld>
-    <p:spTree>
-      <p:nvGrpSpPr>
-        <p:cNvPr id="1" name=""/>
-        <p:cNvGrpSpPr/>
-        <p:nvPr/>
-      </p:nvGrpSpPr>
-      <p:grpSpPr/>
-      <p:sp>
-        <p:nvSpPr>
-          <p:cNvPr id="2" name="Title 1"/>
-          <p:cNvSpPr>
-            <a:spLocks noGrp="1"/>
-          </p:cNvSpPr>
-          <p:nvPr>
-            <p:ph type="title"/>
-          </p:nvPr>
-        </p:nvSpPr>
-        <p:spPr/>
-        <p:txBody>
-          <a:bodyPr/>
-          <a:lstStyle/>
-          <a:p/>
-        </p:txBody>
-      </p:sp>
-      <p:sp>
-        <p:nvSpPr>
-          <p:cNvPr id="3" name="TextBox 2"/>
-          <p:cNvSpPr txBox="1"/>
-          <p:nvPr/>
-        </p:nvSpPr>
-        <p:spPr>
-          <a:xfrm>
-            <a:off x="0" y="0"/>
-            <a:ext cx="6858000" cy="892454"/>
-          </a:xfrm>
-          <a:prstGeom prst="rect">
-            <a:avLst/>
-          </a:prstGeom>
-          <a:noFill/>
-        </p:spPr>
-        <p:txBody>
-          <a:bodyPr wrap="none">
-            <a:spAutoFit/>
-          </a:bodyPr>
-          <a:lstStyle/>
-          <a:p>
-            <a:pPr algn="ctr">
-              <a:defRPr sz="1000"/>
-            </a:pPr>
-            <a:r>
-              <a:t>L'allemagne est un beau pays! L'allemagne est un beau pays! L'allemagne est un beau pays!</a:t>
-            </a:r>
-            <a:br/>
-            <a:r>
-              <a:t>L'allemagne est un beau pays! L'allemagne est un beau pays! L'allemagne est un beau pays!</a:t>
-            </a:r>
-            <a:br/>
-            <a:r>
-              <a:t>L'allemagne est un beau pays! L'allemagne est un beau pays! L'allemagne est un beau pays!</a:t>
-            </a:r>
-            <a:br/>
-            <a:r>
-              <a:t>L'allemagne est un beau pays! L'allemagne est un beau pays! L'allemagne est un beau pays!</a:t>
-            </a:r>
-            <a:br/>
-            <a:r>
-              <a:t>L'allemagne est un beau pays! L'allemagne est un beau pays! </a:t>
-            </a:r>
-          </a:p>
-        </p:txBody>
-      </p:sp>
-      <p:sp>
-        <p:nvSpPr>
-          <p:cNvPr id="2" name="Title 1"/>
-          <p:cNvSpPr>
-            <a:spLocks noGrp="1"/>
-          </p:cNvSpPr>
-          <p:nvPr>
-            <p:ph type="title"/>
-          </p:nvPr>
-        </p:nvSpPr>
-        <p:spPr>
-          <a:xfrm>
-            <a:off x="138545" y="1042454"/>
-            <a:ext cx="6557819" cy="789871"/>
-          </a:xfrm>
-        </p:spPr>
-        <p:txBody>
-          <a:bodyPr/>
-          <a:lstStyle/>
-          <a:p>
-            <a:r>
-              <a:t>Belgique</a:t>
-            </a:r>
-          </a:p>
-        </p:txBody>
-      </p:sp>
-      <p:sp>
-        <p:nvSpPr>
-          <p:cNvPr id="4" name="TextBox 3"/>
-          <p:cNvSpPr txBox="1"/>
-          <p:nvPr/>
-        </p:nvSpPr>
-        <p:spPr>
-          <a:xfrm>
-            <a:off x="0" y="1982325"/>
-            <a:ext cx="6858000" cy="892454"/>
-          </a:xfrm>
-          <a:prstGeom prst="rect">
-            <a:avLst/>
-          </a:prstGeom>
-          <a:noFill/>
-        </p:spPr>
-        <p:txBody>
-          <a:bodyPr wrap="none">
-            <a:spAutoFit/>
-          </a:bodyPr>
-          <a:lstStyle/>
-          <a:p>
-            <a:pPr algn="ctr">
-              <a:defRPr sz="1000"/>
-            </a:pPr>
-            <a:r>
-              <a:t>L'allemagne est un beau pays! L'allemagne est un beau pays! L'allemagne est un beau pays!</a:t>
-            </a:r>
-            <a:br/>
-            <a:r>
-              <a:t>L'allemagne est un beau pays! L'allemagne est un beau pays! L'allemagne est un beau pays!</a:t>
-            </a:r>
-            <a:br/>
-            <a:r>
-              <a:t>L'allemagne est un beau pays! L'allemagne est un beau pays! L'allemagne est un beau pays!</a:t>
-            </a:r>
-            <a:br/>
-            <a:r>
-              <a:t>L'allemagne est un beau pays! L'allemagne est un beau pays! L'allemagne est un beau pays!</a:t>
-            </a:r>
-            <a:br/>
-            <a:r>
-              <a:t>L'allemagne est un beau pays! L'allemagne est un beau pays! </a:t>
-            </a:r>
-          </a:p>
-        </p:txBody>
-      </p:sp>
-    </p:spTree>
   </p:cSld>
   <p:clrMapOvr>
     <a:masterClrMapping/>

</xml_diff>

<commit_message>
adapt sources for word online
</commit_message>
<xml_diff>
--- a/powerpoints/test.pptx
+++ b/powerpoints/test.pptx
@@ -8,6 +8,8 @@
     <p:sldId id="259" r:id="rId5"/>
     <p:sldId id="260" r:id="rId6"/>
     <p:sldId id="261" r:id="rId11"/>
+    <p:sldId id="262" r:id="rId12"/>
+    <p:sldId id="263" r:id="rId13"/>
   </p:sldIdLst>
   <p:sldSz cx="6858000" cy="9144000" type="letter"/>
   <p:notesSz cx="6858000" cy="9144000"/>
@@ -2295,7 +2297,7 @@
               </a:defRPr>
             </a:pPr>
             <a:r>
-              <a:t>France</a:t>
+              <a:t>Canada</a:t>
             </a:r>
           </a:p>
         </p:txBody>
@@ -2309,7 +2311,7 @@
         <p:spPr>
           <a:xfrm>
             <a:off x="138545" y="530000"/>
-            <a:ext cx="6858000" cy="365760"/>
+            <a:ext cx="6858000" cy="274320"/>
           </a:xfrm>
           <a:prstGeom prst="rect">
             <a:avLst/>
@@ -2330,7 +2332,7 @@
               </a:defRPr>
             </a:pPr>
             <a:r>
-              <a:t>Introduction</a:t>
+              <a:t>Santé</a:t>
             </a:r>
           </a:p>
         </p:txBody>
@@ -2343,8 +2345,8 @@
         </p:nvSpPr>
         <p:spPr>
           <a:xfrm>
-            <a:off x="0" y="895760"/>
-            <a:ext cx="6858000" cy="846368"/>
+            <a:off x="0" y="804320"/>
+            <a:ext cx="6858000" cy="1356978"/>
           </a:xfrm>
           <a:prstGeom prst="rect">
             <a:avLst/>
@@ -2361,21 +2363,36 @@
               <a:defRPr sz="1000"/>
             </a:pPr>
             <a:r>
-              <a:t>La France est un beau pays! La France est un beau pays! La France est un beau pays! La France est</a:t>
-            </a:r>
-            <a:br/>
-            <a:r>
-              <a:t>un beau pays! La France est un beau pays! La France est un beau pays! La France est un beau pays!</a:t>
-            </a:r>
-            <a:br/>
-            <a:r>
-              <a:t>La France est un beau pays! La France est un beau pays! La France est un beau pays! La France est</a:t>
-            </a:r>
-            <a:br/>
-            <a:r>
-              <a:t>un beau pays! La France est un beau pays! La France est un beau pays! La France est un beau pays!</a:t>
-            </a:r>
-            <a:br/>
+              <a:t>Le cas de Deep Genomics⁹ au Canada est un bel exemple d’utilisation de l'IA dans les soins de</a:t>
+            </a:r>
+            <a:br/>
+            <a:r>
+              <a:t>santé, cela grâce à des algorithmes servant à prédire des maladies, à améliorer le diagnostic et</a:t>
+            </a:r>
+            <a:br/>
+            <a:r>
+              <a:t>à personnaliser les traitements. Dans ce contexte, l'intelligence artificielle est utilisée pour</a:t>
+            </a:r>
+            <a:br/>
+            <a:r>
+              <a:t>analyser des données génétiques dans le but d'identifier de nouvelles cibles pour le</a:t>
+            </a:r>
+            <a:br/>
+            <a:r>
+              <a:t>développement de médicaments. Il est également fait recours à l'apprentissage automatique pour</a:t>
+            </a:r>
+            <a:br/>
+            <a:r>
+              <a:t>prédire comment les mutations génétiques peuvent affecter la fonction des protéines et causer des</a:t>
+            </a:r>
+            <a:br/>
+            <a:r>
+              <a:t>maladies. Cela peut aider à accélérer le processus de découverte de médicaments et à développer</a:t>
+            </a:r>
+            <a:br/>
+            <a:r>
+              <a:t>de nouvelles thérapies pour des maladies qui étaient auparavant difficiles à traiter.</a:t>
+            </a:r>
           </a:p>
         </p:txBody>
       </p:sp>
@@ -2387,8 +2404,8 @@
         </p:nvSpPr>
         <p:spPr>
           <a:xfrm>
-            <a:off x="138545" y="1742128"/>
-            <a:ext cx="6858000" cy="365760"/>
+            <a:off x="138545" y="2161298"/>
+            <a:ext cx="6858000" cy="274320"/>
           </a:xfrm>
           <a:prstGeom prst="rect">
             <a:avLst/>
@@ -2409,7 +2426,7 @@
               </a:defRPr>
             </a:pPr>
             <a:r>
-              <a:t>Description</a:t>
+              <a:t>L’environnement et l’énergie</a:t>
             </a:r>
           </a:p>
         </p:txBody>
@@ -2422,8 +2439,8 @@
         </p:nvSpPr>
         <p:spPr>
           <a:xfrm>
-            <a:off x="0" y="2107888"/>
-            <a:ext cx="6858000" cy="1050462"/>
+            <a:off x="0" y="2435618"/>
+            <a:ext cx="6858000" cy="1842250"/>
           </a:xfrm>
           <a:prstGeom prst="rect">
             <a:avLst/>
@@ -2440,66 +2457,51 @@
               <a:defRPr sz="1000"/>
             </a:pPr>
             <a:r>
-              <a:t>La France est vraiment un super beau pays! La France est vraiment un super beau pays! La France</a:t>
-            </a:r>
-            <a:br/>
-            <a:r>
-              <a:t>est vraiment un super beau pays! La France est vraiment un super beau pays! La France est</a:t>
-            </a:r>
-            <a:br/>
-            <a:r>
-              <a:t>vraiment un super beau pays! La France est vraiment un super beau pays! La France est vraiment un</a:t>
-            </a:r>
-            <a:br/>
-            <a:r>
-              <a:t>super beau pays! La France est vraiment un super beau pays! La France est vraiment un super beau</a:t>
-            </a:r>
-            <a:br/>
-            <a:r>
-              <a:t>pays! La France est vraiment un super beau pays! La France est vraiment un super beau pays! La</a:t>
-            </a:r>
-            <a:br/>
-            <a:r>
-              <a:t>France est vraiment un super beau pays! </a:t>
-            </a:r>
-          </a:p>
-        </p:txBody>
-      </p:sp>
-      <p:sp>
-        <p:nvSpPr>
-          <p:cNvPr id="2" name="Titre 1">
-            <a:extLst>
-              <a:ext uri="{FF2B5EF4-FFF2-40B4-BE49-F238E27FC236}">
-                <a16:creationId xmlns:a16="http://schemas.microsoft.com/office/drawing/2014/main" id="{486D4E87-2BC6-989D-C31B-C94C23654F8A}"/>
-              </a:ext>
-            </a:extLst>
-          </p:cNvPr>
-          <p:cNvSpPr>
-            <a:spLocks noGrp="1"/>
-          </p:cNvSpPr>
-          <p:nvPr>
-            <p:ph type="title"/>
-          </p:nvPr>
-        </p:nvSpPr>
-        <p:spPr>
-          <a:xfrm>
-            <a:off x="138545" y="3173350"/>
-            <a:ext cx="6557819" cy="400000"/>
-          </a:xfrm>
-        </p:spPr>
-        <p:txBody>
-          <a:bodyPr/>
-          <a:lstStyle/>
-          <a:p>
-            <a:pPr>
-              <a:defRPr b="1" i="1">
-                <a:solidFill>
-                  <a:schemeClr val="bg1"/>
-                </a:solidFill>
-              </a:defRPr>
-            </a:pPr>
-            <a:r>
-              <a:t>Australie</a:t>
+              <a:t>Opus One Solutions est une entreprise basée à Toronto qui utilise l'IA pour améliorer grandement</a:t>
+            </a:r>
+            <a:br/>
+            <a:r>
+              <a:t>la distribution d'énergie dans les réseaux électriques. Ils se sont spécialisés dans le</a:t>
+            </a:r>
+            <a:br/>
+            <a:r>
+              <a:t>développement d’une plateforme appelée GridOS¹⁰ qui utilise l'IA et l'analyse de données pour</a:t>
+            </a:r>
+            <a:br/>
+            <a:r>
+              <a:t>modéliser et simuler le flux d'électricité dans un réseau de distribution. Cette technologie</a:t>
+            </a:r>
+            <a:br/>
+            <a:r>
+              <a:t>offre aux fournisseurs d'énergie la possibilité de mieux comprendre comment l'énergie est</a:t>
+            </a:r>
+            <a:br/>
+            <a:r>
+              <a:t>utilisée dans le réseau, ce qui peut aider à identifier les inefficacités et à optimiser la</a:t>
+            </a:r>
+            <a:br/>
+            <a:r>
+              <a:t>distribution d'énergie. Ainsi, GridOS peut aider à intégrer les sources d'énergie renouvelables</a:t>
+            </a:r>
+            <a:br/>
+            <a:r>
+              <a:t>dans le réseau de manière plus efficace en prévoyant la production d'énergie en fonction des</a:t>
+            </a:r>
+            <a:br/>
+            <a:r>
+              <a:t>conditions météorologiques et de la demande en électricité. Cette utilisation de l'IA peut non</a:t>
+            </a:r>
+            <a:br/>
+            <a:r>
+              <a:t>seulement améliorer l'efficacité énergétique, mais aussi favoriser une transition plus fluide</a:t>
+            </a:r>
+            <a:br/>
+            <a:r>
+              <a:t>vers les sources d'énergie renouvelables, ce qui est crucial pour lutter contre le changement</a:t>
+            </a:r>
+            <a:br/>
+            <a:r>
+              <a:t>climatique.</a:t>
             </a:r>
           </a:p>
         </p:txBody>
@@ -2512,8 +2514,8 @@
         </p:nvSpPr>
         <p:spPr>
           <a:xfrm>
-            <a:off x="0" y="3588350"/>
-            <a:ext cx="6858000" cy="938540"/>
+            <a:off x="138545" y="4277868"/>
+            <a:ext cx="6858000" cy="274320"/>
           </a:xfrm>
           <a:prstGeom prst="rect">
             <a:avLst/>
@@ -2526,66 +2528,15 @@
           </a:bodyPr>
           <a:lstStyle/>
           <a:p>
-            <a:pPr algn="ctr">
-              <a:defRPr sz="1000"/>
-            </a:pPr>
-            <a:r>
-              <a:t>L'allemagne est une³ beau pays! L'allemagne est une³ beau pays! L'allemagne est une³ beau pays!</a:t>
-            </a:r>
-            <a:br/>
-            <a:r>
-              <a:t>L'allemagne est une³ beau pays! L'allemagne est une³ beau pays! L'allemagne est une³ beau pays!</a:t>
-            </a:r>
-            <a:br/>
-            <a:r>
-              <a:t>L'allemagne est une³ beau pays! L'allemagne est une³ beau pays! L'allemagne est une³ beau pays!</a:t>
-            </a:r>
-            <a:br/>
-            <a:r>
-              <a:t>L'allemagne est une³ beau pays! L'allemagne est une³ beau pays! L'allemagne est une³ beau pays!</a:t>
-            </a:r>
-            <a:br/>
-            <a:r>
-              <a:t>L'allemagne est une³ beau pays! L'allemagne est une³ beau pays! </a:t>
-            </a:r>
-          </a:p>
-        </p:txBody>
-      </p:sp>
-      <p:sp>
-        <p:nvSpPr>
-          <p:cNvPr id="2" name="Titre 1">
-            <a:extLst>
-              <a:ext uri="{FF2B5EF4-FFF2-40B4-BE49-F238E27FC236}">
-                <a16:creationId xmlns:a16="http://schemas.microsoft.com/office/drawing/2014/main" id="{486D4E87-2BC6-989D-C31B-C94C23654F8A}"/>
-              </a:ext>
-            </a:extLst>
-          </p:cNvPr>
-          <p:cNvSpPr>
-            <a:spLocks noGrp="1"/>
-          </p:cNvSpPr>
-          <p:nvPr>
-            <p:ph type="title"/>
-          </p:nvPr>
-        </p:nvSpPr>
-        <p:spPr>
-          <a:xfrm>
-            <a:off x="138545" y="4541890"/>
-            <a:ext cx="6557819" cy="400000"/>
-          </a:xfrm>
-        </p:spPr>
-        <p:txBody>
-          <a:bodyPr/>
-          <a:lstStyle/>
-          <a:p>
             <a:pPr>
-              <a:defRPr b="1" i="1">
+              <a:defRPr sz="1100" b="1">
                 <a:solidFill>
-                  <a:schemeClr val="bg1"/>
+                  <a:schemeClr val="accent6"/>
                 </a:solidFill>
               </a:defRPr>
             </a:pPr>
             <a:r>
-              <a:t>Canada</a:t>
+              <a:t>Les services financiers</a:t>
             </a:r>
           </a:p>
         </p:txBody>
@@ -2598,8 +2549,8 @@
         </p:nvSpPr>
         <p:spPr>
           <a:xfrm>
-            <a:off x="0" y="4956890"/>
-            <a:ext cx="6858000" cy="1307226"/>
+            <a:off x="0" y="4552188"/>
+            <a:ext cx="6858000" cy="993861"/>
           </a:xfrm>
           <a:prstGeom prst="rect">
             <a:avLst/>
@@ -2616,70 +2567,27 @@
               <a:defRPr sz="1000"/>
             </a:pPr>
             <a:r>
-              <a:t>Le Canada de magne est un superbe de beau pays! Le Canada de magne est un superbe de beau pays!</a:t>
-            </a:r>
-            <a:br/>
-            <a:r>
-              <a:t>Le Canada de magne est un superbe de beau pays! Le Canada de magne est un superbe de beau pays!</a:t>
-            </a:r>
-            <a:br/>
-            <a:r>
-              <a:t>Le Canada de magne est un superbe de beau pays! Le Canada de magne est un superbe de beau pays!</a:t>
-            </a:r>
-            <a:br/>
-            <a:r>
-              <a:t>Le Canada de magne est un superbe de beau pays! Le Canada de magne est un superbe de beau pays!</a:t>
-            </a:r>
-            <a:br/>
-            <a:r>
-              <a:t>Le Canada de magne est un superbe de beau pays! Le Canada de magne est un superbe de beau pays!</a:t>
-            </a:r>
-            <a:br/>
-            <a:r>
-              <a:t>Le Canada de magne est un superbe de beau pays! Le Canada de magne est un superbe de beau pays!</a:t>
-            </a:r>
-            <a:br/>
-            <a:r>
-              <a:t>Le Canada de magne est un superbe de beau pays! Le Canada de magne est un superbe de beau pays! </a:t>
-            </a:r>
-          </a:p>
-        </p:txBody>
-      </p:sp>
-      <p:sp>
-        <p:nvSpPr>
-          <p:cNvPr id="2" name="Titre 1">
-            <a:extLst>
-              <a:ext uri="{FF2B5EF4-FFF2-40B4-BE49-F238E27FC236}">
-                <a16:creationId xmlns:a16="http://schemas.microsoft.com/office/drawing/2014/main" id="{486D4E87-2BC6-989D-C31B-C94C23654F8A}"/>
-              </a:ext>
-            </a:extLst>
-          </p:cNvPr>
-          <p:cNvSpPr>
-            <a:spLocks noGrp="1"/>
-          </p:cNvSpPr>
-          <p:nvPr>
-            <p:ph type="title"/>
-          </p:nvPr>
-        </p:nvSpPr>
-        <p:spPr>
-          <a:xfrm>
-            <a:off x="138545" y="6279116"/>
-            <a:ext cx="6557819" cy="400000"/>
-          </a:xfrm>
-        </p:spPr>
-        <p:txBody>
-          <a:bodyPr/>
-          <a:lstStyle/>
-          <a:p>
-            <a:pPr>
-              <a:defRPr b="1" i="1">
-                <a:solidFill>
-                  <a:schemeClr val="bg1"/>
-                </a:solidFill>
-              </a:defRPr>
-            </a:pPr>
-            <a:r>
-              <a:t>Kenya</a:t>
+              <a:t>Avec des entreprises comme Wealthsimple qui utilisent l'IA pour fournir des conseils financiers</a:t>
+            </a:r>
+            <a:br/>
+            <a:r>
+              <a:t>personnalisés, le Canada propose des solutions innovantes d’intégration de cette technologie au</a:t>
+            </a:r>
+            <a:br/>
+            <a:r>
+              <a:t>monde de la finance. En effet, Wealthsimple¹¹ utilise l'IA pour fournir des conseils</a:t>
+            </a:r>
+            <a:br/>
+            <a:r>
+              <a:t>d'investissement automatisés. En utilisant des algorithmes, la plateforme peut analyser les</a:t>
+            </a:r>
+            <a:br/>
+            <a:r>
+              <a:t>données financières de l'utilisateur, comprendre ses objectifs financiers, évaluer sa tolérance</a:t>
+            </a:r>
+            <a:br/>
+            <a:r>
+              <a:t>au risque et créer un portefeuille d'investissement personnalisé.</a:t>
             </a:r>
           </a:p>
         </p:txBody>
@@ -2692,8 +2600,8 @@
         </p:nvSpPr>
         <p:spPr>
           <a:xfrm>
-            <a:off x="0" y="6694116"/>
-            <a:ext cx="6858000" cy="1238097"/>
+            <a:off x="138545" y="5546049"/>
+            <a:ext cx="6858000" cy="274320"/>
           </a:xfrm>
           <a:prstGeom prst="rect">
             <a:avLst/>
@@ -2706,74 +2614,105 @@
           </a:bodyPr>
           <a:lstStyle/>
           <a:p>
+            <a:pPr>
+              <a:defRPr sz="1100" b="1">
+                <a:solidFill>
+                  <a:schemeClr val="accent6"/>
+                </a:solidFill>
+              </a:defRPr>
+            </a:pPr>
+            <a:r>
+              <a:t>L’agriculture</a:t>
+            </a:r>
+          </a:p>
+        </p:txBody>
+      </p:sp>
+      <p:sp>
+        <p:nvSpPr>
+          <p:cNvPr id="10" name="TextBox 9"/>
+          <p:cNvSpPr txBox="1"/>
+          <p:nvPr/>
+        </p:nvSpPr>
+        <p:spPr>
+          <a:xfrm>
+            <a:off x="0" y="5820369"/>
+            <a:ext cx="6858000" cy="1203030"/>
+          </a:xfrm>
+          <a:prstGeom prst="rect">
+            <a:avLst/>
+          </a:prstGeom>
+          <a:noFill/>
+        </p:spPr>
+        <p:txBody>
+          <a:bodyPr wrap="none">
+            <a:spAutoFit/>
+          </a:bodyPr>
+          <a:lstStyle/>
+          <a:p>
             <a:pPr algn="ctr">
               <a:defRPr sz="1000"/>
             </a:pPr>
             <a:r>
-              <a:t>Le Kenya de magne est un vraiment beau pays! Le Kenya de magne est un vraiment beau pays! Le</a:t>
-            </a:r>
-            <a:br/>
-            <a:r>
-              <a:t>Kenya de magne est un vraiment beau pays! Le Kenya de magne est un vraiment beau pays! Le Kenya</a:t>
-            </a:r>
-            <a:br/>
-            <a:r>
-              <a:t>de magne est un vraiment beau pays! Le Kenya de magne est un vraiment beau pays! Le Kenya de</a:t>
-            </a:r>
-            <a:br/>
-            <a:r>
-              <a:t>magne est un vraiment beau pays! Le Kenya de magne est un vraiment beau pays! Le Kenya de magne</a:t>
-            </a:r>
-            <a:br/>
-            <a:r>
-              <a:t>est un vraiment beau pays! Le Kenya de magne est un vraiment beau pays! Le Kenya de magne est un</a:t>
-            </a:r>
-            <a:br/>
-            <a:r>
-              <a:t>vraiment beau pays! Le Kenya de magne est un vraiment beau pays! Le Kenya de magne est un</a:t>
-            </a:r>
-            <a:br/>
-            <a:r>
-              <a:t>vraiment beau pays! Le Kenya de magne est un vraiment beau pays! </a:t>
-            </a:r>
-          </a:p>
-        </p:txBody>
-      </p:sp>
-      <p:sp>
-        <p:nvSpPr>
-          <p:cNvPr id="2" name="Titre 1">
-            <a:extLst>
-              <a:ext uri="{FF2B5EF4-FFF2-40B4-BE49-F238E27FC236}">
-                <a16:creationId xmlns:a16="http://schemas.microsoft.com/office/drawing/2014/main" id="{486D4E87-2BC6-989D-C31B-C94C23654F8A}"/>
-              </a:ext>
-            </a:extLst>
-          </p:cNvPr>
-          <p:cNvSpPr>
-            <a:spLocks noGrp="1"/>
-          </p:cNvSpPr>
-          <p:nvPr>
-            <p:ph type="title"/>
-          </p:nvPr>
-        </p:nvSpPr>
-        <p:spPr>
-          <a:xfrm>
-            <a:off x="138545" y="7947213"/>
-            <a:ext cx="6557819" cy="400000"/>
-          </a:xfrm>
-        </p:spPr>
-        <p:txBody>
-          <a:bodyPr/>
+              <a:t>Blue River Technology, qui est une filiale de John Deere, s’impose encore en 2023 avec une</a:t>
+            </a:r>
+            <a:br/>
+            <a:r>
+              <a:t>technologie d'agriculture de précision qui utilise l'IA pour identifier et éliminer les mauvaises</a:t>
+            </a:r>
+            <a:br/>
+            <a:r>
+              <a:t>herbes. Leur technologie "See &amp; Spray"¹² utilise l'apprentissage automatique pour différencier</a:t>
+            </a:r>
+            <a:br/>
+            <a:r>
+              <a:t>les plantes des mauvaises herbes et appliquer les herbicides de manière plus précise, ce qui</a:t>
+            </a:r>
+            <a:br/>
+            <a:r>
+              <a:t>réduit l'utilisation de produits chimiques et améliore les rendements agricoles. Par ailleurs</a:t>
+            </a:r>
+            <a:br/>
+            <a:r>
+              <a:t>l’entreprise québécoise Vooban¹³, spécialisée dans l’agriculture de précision a développé une</a:t>
+            </a:r>
+            <a:br/>
+            <a:r>
+              <a:t>technologie fondée sur l’IA capable de trier et d’apprécier la qualité de pommes de terre.</a:t>
+            </a:r>
+          </a:p>
+        </p:txBody>
+      </p:sp>
+      <p:sp>
+        <p:nvSpPr>
+          <p:cNvPr id="11" name="TextBox 10"/>
+          <p:cNvSpPr txBox="1"/>
+          <p:nvPr/>
+        </p:nvSpPr>
+        <p:spPr>
+          <a:xfrm>
+            <a:off x="138545" y="7023399"/>
+            <a:ext cx="6858000" cy="274320"/>
+          </a:xfrm>
+          <a:prstGeom prst="rect">
+            <a:avLst/>
+          </a:prstGeom>
+          <a:noFill/>
+        </p:spPr>
+        <p:txBody>
+          <a:bodyPr wrap="none">
+            <a:spAutoFit/>
+          </a:bodyPr>
           <a:lstStyle/>
           <a:p>
             <a:pPr>
-              <a:defRPr b="1" i="1">
+              <a:defRPr sz="1100" b="1">
                 <a:solidFill>
-                  <a:schemeClr val="bg1"/>
+                  <a:schemeClr val="accent6"/>
                 </a:solidFill>
               </a:defRPr>
             </a:pPr>
             <a:r>
-              <a:t>Belgique</a:t>
+              <a:t>Les Initiatives gouvernementales</a:t>
             </a:r>
           </a:p>
         </p:txBody>
@@ -2810,7 +2749,7 @@
         <p:spPr>
           <a:xfrm>
             <a:off x="0" y="0"/>
-            <a:ext cx="6858000" cy="1238097"/>
+            <a:ext cx="6858000" cy="2156841"/>
           </a:xfrm>
           <a:prstGeom prst="rect">
             <a:avLst/>
@@ -2827,31 +2766,1181 @@
               <a:defRPr sz="1000"/>
             </a:pPr>
             <a:r>
-              <a:t>La Belgique est un beau pays! j'y suis allé. La Belgique est un beau pays! j'y suis allé. La</a:t>
-            </a:r>
-            <a:br/>
-            <a:r>
-              <a:t>Belgique est un beau pays! j'y suis allé. La Belgique est un beau pays! j'y suis allé. La</a:t>
-            </a:r>
-            <a:br/>
-            <a:r>
-              <a:t>Belgique est un beau pays! j'y suis allé. La Belgique est un beau pays! j'y suis allé. La</a:t>
-            </a:r>
-            <a:br/>
-            <a:r>
-              <a:t>Belgique est un beau pays! j'y suis allé. La Belgique est un beau pays! j'y suis allé. La</a:t>
-            </a:r>
-            <a:br/>
-            <a:r>
-              <a:t>Belgique est un beau pays! j'y suis allé. La Belgique est un beau pays! j'y suis allé. La</a:t>
-            </a:r>
-            <a:br/>
-            <a:r>
-              <a:t>Belgique est un beau pays! j'y suis allé. La Belgique est un beau pays! j'y suis allé. La</a:t>
-            </a:r>
-            <a:br/>
-            <a:r>
-              <a:t>Belgique est un beau pays! j'y suis allé. La Belgique est un beau pays! j'y suis allé. </a:t>
+              <a:t>En 2017, le gouvernement canadien, par l'intermédiaire de l'Institut canadien de recherches</a:t>
+            </a:r>
+            <a:br/>
+            <a:r>
+              <a:t>avancées (CIFAR)¹⁴, a lancé la Stratégie pancanadienne en matière d'IA. C'est le premier</a:t>
+            </a:r>
+            <a:br/>
+            <a:r>
+              <a:t>programme national d'IA au monde, avec un investissement de 125 millions de dollars canadiens sur</a:t>
+            </a:r>
+            <a:br/>
+            <a:r>
+              <a:t>cinq ans. L'objectif de cette stratégie est de soutenir la recherche sur l'IA, de développer le</a:t>
+            </a:r>
+            <a:br/>
+            <a:r>
+              <a:t>talent en IA et de stimuler l'adoption de l'IA dans les secteurs public et privé. Dans le cadre</a:t>
+            </a:r>
+            <a:br/>
+            <a:r>
+              <a:t>de cette stratégie, trois nouveaux instituts d'IA ont été créés dans le pays : L'Institut d'IA</a:t>
+            </a:r>
+            <a:br/>
+            <a:r>
+              <a:t>Amii (Alberta Machine Intelligence Institute) à Edmonton, l'Institut Vector pour l'intelligence</a:t>
+            </a:r>
+            <a:br/>
+            <a:r>
+              <a:t>artificielle à Toronto et le MILA (Institut québécois d'intelligence artificielle) à Montréal.</a:t>
+            </a:r>
+            <a:br/>
+            <a:r>
+              <a:t>Ces instituts sont chargés de la recherche en IA, de la formation des futurs experts en IA et de</a:t>
+            </a:r>
+            <a:br/>
+            <a:r>
+              <a:t>la collaboration avec les entreprises pour aider à l'adoption de l'IA. Ils travaillent également</a:t>
+            </a:r>
+            <a:br/>
+            <a:r>
+              <a:t>avec le gouvernement et le public pour discuter des implications éthiques de l'IA. Encore en 2023</a:t>
+            </a:r>
+            <a:br/>
+            <a:r>
+              <a:t>plusieurs initiatives ont été prises sous la houlette de la Stratégie pancanadienne en matière</a:t>
+            </a:r>
+            <a:br/>
+            <a:r>
+              <a:t>d'IA, à l’instar de l’organisation de symposium sur l’énergie et l’environnement.</a:t>
+            </a:r>
+          </a:p>
+        </p:txBody>
+      </p:sp>
+      <p:sp>
+        <p:nvSpPr>
+          <p:cNvPr id="4" name="TextBox 3"/>
+          <p:cNvSpPr txBox="1"/>
+          <p:nvPr/>
+        </p:nvSpPr>
+        <p:spPr>
+          <a:xfrm>
+            <a:off x="0" y="2156841"/>
+            <a:ext cx="6858000" cy="714411"/>
+          </a:xfrm>
+          <a:prstGeom prst="rect">
+            <a:avLst/>
+          </a:prstGeom>
+          <a:noFill/>
+        </p:spPr>
+        <p:txBody>
+          <a:bodyPr wrap="none">
+            <a:spAutoFit/>
+          </a:bodyPr>
+          <a:lstStyle/>
+          <a:p>
+            <a:pPr algn="ctr">
+              <a:defRPr sz="1000"/>
+            </a:pPr>
+            <a:r>
+              <a:t>Dans le même sens, la province de Québec s’est illustrée par la mise en place d’une stratégie</a:t>
+            </a:r>
+            <a:br/>
+            <a:r>
+              <a:t>d’intégration de l’IA au sein du dispositif de l’administration publique. Cette stratégie se</a:t>
+            </a:r>
+            <a:br/>
+            <a:r>
+              <a:t>déployant sur l’horizon 2021- 2026 développe l’intérêt de l’IA, ses potentialités dans un</a:t>
+            </a:r>
+            <a:br/>
+            <a:r>
+              <a:t>contexte d’intégration au secteur public mais aussi les enjeux d’une telle démarche.¹⁵</a:t>
+            </a:r>
+          </a:p>
+        </p:txBody>
+      </p:sp>
+      <p:sp>
+        <p:nvSpPr>
+          <p:cNvPr id="2" name="Title 1"/>
+          <p:cNvSpPr>
+            <a:spLocks noGrp="1"/>
+          </p:cNvSpPr>
+          <p:nvPr>
+            <p:ph type="title"/>
+          </p:nvPr>
+        </p:nvSpPr>
+        <p:spPr>
+          <a:xfrm>
+            <a:off x="138545" y="2886252"/>
+            <a:ext cx="6557819" cy="400000"/>
+          </a:xfrm>
+        </p:spPr>
+        <p:txBody>
+          <a:bodyPr/>
+          <a:lstStyle/>
+          <a:p>
+            <a:pPr>
+              <a:defRPr b="1" i="1">
+                <a:solidFill>
+                  <a:schemeClr val="bg1"/>
+                </a:solidFill>
+              </a:defRPr>
+            </a:pPr>
+            <a:r>
+              <a:t>Etats-unis</a:t>
+            </a:r>
+          </a:p>
+        </p:txBody>
+      </p:sp>
+      <p:sp>
+        <p:nvSpPr>
+          <p:cNvPr id="5" name="TextBox 4"/>
+          <p:cNvSpPr txBox="1"/>
+          <p:nvPr/>
+        </p:nvSpPr>
+        <p:spPr>
+          <a:xfrm>
+            <a:off x="138545" y="3301252"/>
+            <a:ext cx="6858000" cy="274320"/>
+          </a:xfrm>
+          <a:prstGeom prst="rect">
+            <a:avLst/>
+          </a:prstGeom>
+          <a:noFill/>
+        </p:spPr>
+        <p:txBody>
+          <a:bodyPr wrap="none">
+            <a:spAutoFit/>
+          </a:bodyPr>
+          <a:lstStyle/>
+          <a:p>
+            <a:pPr>
+              <a:defRPr sz="1100" b="1">
+                <a:solidFill>
+                  <a:schemeClr val="accent6"/>
+                </a:solidFill>
+              </a:defRPr>
+            </a:pPr>
+            <a:r>
+              <a:t>L’innovation dans le domaine de la Santé</a:t>
+            </a:r>
+          </a:p>
+        </p:txBody>
+      </p:sp>
+      <p:sp>
+        <p:nvSpPr>
+          <p:cNvPr id="6" name="TextBox 5"/>
+          <p:cNvSpPr txBox="1"/>
+          <p:nvPr/>
+        </p:nvSpPr>
+        <p:spPr>
+          <a:xfrm>
+            <a:off x="0" y="3575572"/>
+            <a:ext cx="6858000" cy="1395465"/>
+          </a:xfrm>
+          <a:prstGeom prst="rect">
+            <a:avLst/>
+          </a:prstGeom>
+          <a:noFill/>
+        </p:spPr>
+        <p:txBody>
+          <a:bodyPr wrap="none">
+            <a:spAutoFit/>
+          </a:bodyPr>
+          <a:lstStyle/>
+          <a:p>
+            <a:pPr algn="ctr">
+              <a:defRPr sz="1000"/>
+            </a:pPr>
+            <a:r>
+              <a:t>L'IA est utilisée pour analyser les images médicales et détecter des anomalies qui pourraient</a:t>
+            </a:r>
+            <a:br/>
+            <a:r>
+              <a:t>être invisibles ou difficiles à repérer pour l'œil humain. Aidoc, une firme américaine</a:t>
+            </a:r>
+            <a:br/>
+            <a:r>
+              <a:t>spécialisée dans l’incubation de solutions technologiques dans le domaine médical utilise l'IA</a:t>
+            </a:r>
+            <a:br/>
+            <a:r>
+              <a:t>pour identifier rapidement les accidents vasculaires cérébraux sur les scans de la tête¹⁶. Leur</a:t>
+            </a:r>
+            <a:br/>
+            <a:r>
+              <a:t>système peut envoyer des alertes aux médecins, ce qui peut aider à accélérer le traitement. De</a:t>
+            </a:r>
+            <a:br/>
+            <a:r>
+              <a:t>même, Deeper insights¹⁷ promeut l’utilisation de l'IA pour aider l’industrie pharmaceutique. Ils</a:t>
+            </a:r>
+            <a:br/>
+            <a:r>
+              <a:t>mènent des projets visant à améliorer les analyses de divers types d'images médicales, y compris</a:t>
+            </a:r>
+            <a:br/>
+            <a:r>
+              <a:t>les radiographies et les IRM, pour détecter une gamme de conditions, du cancer au maladies</a:t>
+            </a:r>
+            <a:br/>
+            <a:r>
+              <a:t>cardiovasculaires.</a:t>
+            </a:r>
+          </a:p>
+        </p:txBody>
+      </p:sp>
+      <p:sp>
+        <p:nvSpPr>
+          <p:cNvPr id="7" name="TextBox 6"/>
+          <p:cNvSpPr txBox="1"/>
+          <p:nvPr/>
+        </p:nvSpPr>
+        <p:spPr>
+          <a:xfrm>
+            <a:off x="0" y="4971037"/>
+            <a:ext cx="6858000" cy="1256577"/>
+          </a:xfrm>
+          <a:prstGeom prst="rect">
+            <a:avLst/>
+          </a:prstGeom>
+          <a:noFill/>
+        </p:spPr>
+        <p:txBody>
+          <a:bodyPr wrap="none">
+            <a:spAutoFit/>
+          </a:bodyPr>
+          <a:lstStyle/>
+          <a:p>
+            <a:pPr algn="ctr">
+              <a:defRPr sz="1000"/>
+            </a:pPr>
+            <a:r>
+              <a:t>Singulièrement en matière de soutien médical, l’analyse prédictive a le vent en poupe aux Etats</a:t>
+            </a:r>
+            <a:br/>
+            <a:r>
+              <a:t>Unis. L'IA y est utilisée pour analyser les données de santé à grande échelle afin de prédire les</a:t>
+            </a:r>
+            <a:br/>
+            <a:r>
+              <a:t>risques individuels de santé et d'informer les soins personnalisés. Une firme comme Tempus¹⁸,</a:t>
+            </a:r>
+            <a:br/>
+            <a:r>
+              <a:t>utilise l'IA pour analyser les données génomiques, cliniques et autres pour identifier des motifs</a:t>
+            </a:r>
+            <a:br/>
+            <a:r>
+              <a:t>qui peuvent prédire comment une maladie pourrait progresser chez un patient particulier ou</a:t>
+            </a:r>
+            <a:br/>
+            <a:r>
+              <a:t>comment ce patient pourrait répondre à un certain traitement. Subséquemment, ces informations</a:t>
+            </a:r>
+            <a:br/>
+            <a:r>
+              <a:t>peuvent ensuite être utilisées pour aider les médecins à choisir le meilleur plan de traitement</a:t>
+            </a:r>
+            <a:br/>
+            <a:r>
+              <a:t>pour chaque patient.</a:t>
+            </a:r>
+          </a:p>
+        </p:txBody>
+      </p:sp>
+      <p:sp>
+        <p:nvSpPr>
+          <p:cNvPr id="8" name="TextBox 7"/>
+          <p:cNvSpPr txBox="1"/>
+          <p:nvPr/>
+        </p:nvSpPr>
+        <p:spPr>
+          <a:xfrm>
+            <a:off x="138545" y="6227614"/>
+            <a:ext cx="6858000" cy="274320"/>
+          </a:xfrm>
+          <a:prstGeom prst="rect">
+            <a:avLst/>
+          </a:prstGeom>
+          <a:noFill/>
+        </p:spPr>
+        <p:txBody>
+          <a:bodyPr wrap="none">
+            <a:spAutoFit/>
+          </a:bodyPr>
+          <a:lstStyle/>
+          <a:p>
+            <a:pPr>
+              <a:defRPr sz="1100" b="1">
+                <a:solidFill>
+                  <a:schemeClr val="accent6"/>
+                </a:solidFill>
+              </a:defRPr>
+            </a:pPr>
+            <a:r>
+              <a:t>E-commerce</a:t>
+            </a:r>
+          </a:p>
+        </p:txBody>
+      </p:sp>
+      <p:sp>
+        <p:nvSpPr>
+          <p:cNvPr id="9" name="TextBox 8"/>
+          <p:cNvSpPr txBox="1"/>
+          <p:nvPr/>
+        </p:nvSpPr>
+        <p:spPr>
+          <a:xfrm>
+            <a:off x="0" y="6501934"/>
+            <a:ext cx="6858000" cy="1738503"/>
+          </a:xfrm>
+          <a:prstGeom prst="rect">
+            <a:avLst/>
+          </a:prstGeom>
+          <a:noFill/>
+        </p:spPr>
+        <p:txBody>
+          <a:bodyPr wrap="none">
+            <a:spAutoFit/>
+          </a:bodyPr>
+          <a:lstStyle/>
+          <a:p>
+            <a:pPr algn="ctr">
+              <a:defRPr sz="1000"/>
+            </a:pPr>
+            <a:r>
+              <a:t>Le géant de la tech Amazon¹⁹ n’est pas en reste et s’illustre par son recours massif à</a:t>
+            </a:r>
+            <a:br/>
+            <a:r>
+              <a:t>l’intelligence artificielle. En effet, Amazon utilise l'IA pour analyser le comportement d'achat</a:t>
+            </a:r>
+            <a:br/>
+            <a:r>
+              <a:t>des clients et leur historique de navigation afin de recommander des produits susceptibles de les</a:t>
+            </a:r>
+            <a:br/>
+            <a:r>
+              <a:t>intéresser. Cette approche personnalisée a été l'une des clés de son succès dans le commerce</a:t>
+            </a:r>
+            <a:br/>
+            <a:r>
+              <a:t>électronique. En outre Alexa, le service vocal d'Amazon, est basé sur de l'intelligence</a:t>
+            </a:r>
+            <a:br/>
+            <a:r>
+              <a:t>artificielle. Alexa peut répondre aux questions, jouer de la musique, gérer des rappels</a:t>
+            </a:r>
+            <a:br/>
+            <a:r>
+              <a:t>intelligents et même contrôler d'autres appareils connectés à la maison, tout cela en utilisant</a:t>
+            </a:r>
+            <a:br/>
+            <a:r>
+              <a:t>le langage naturel, grâce à l'IA. Toujours sur la même lancée Amazon a même créé des magasins</a:t>
+            </a:r>
+            <a:br/>
+            <a:r>
+              <a:t>sans caisse, appelés Amazon Go, qui utilisent l'IA pour suivre les produits que les clients</a:t>
+            </a:r>
+            <a:br/>
+            <a:r>
+              <a:t>prennent des étagères. Une fois les achats terminés, les clients quittent simplement le magasin</a:t>
+            </a:r>
+            <a:br/>
+            <a:r>
+              <a:t>et Amazon facture automatiquement leur compte.</a:t>
+            </a:r>
+          </a:p>
+        </p:txBody>
+      </p:sp>
+      <p:sp>
+        <p:nvSpPr>
+          <p:cNvPr id="10" name="TextBox 9"/>
+          <p:cNvSpPr txBox="1"/>
+          <p:nvPr/>
+        </p:nvSpPr>
+        <p:spPr>
+          <a:xfrm>
+            <a:off x="138545" y="8240437"/>
+            <a:ext cx="6858000" cy="274320"/>
+          </a:xfrm>
+          <a:prstGeom prst="rect">
+            <a:avLst/>
+          </a:prstGeom>
+          <a:noFill/>
+        </p:spPr>
+        <p:txBody>
+          <a:bodyPr wrap="none">
+            <a:spAutoFit/>
+          </a:bodyPr>
+          <a:lstStyle/>
+          <a:p>
+            <a:pPr>
+              <a:defRPr sz="1100" b="1">
+                <a:solidFill>
+                  <a:schemeClr val="accent6"/>
+                </a:solidFill>
+              </a:defRPr>
+            </a:pPr>
+            <a:r>
+              <a:t>Travail et performances</a:t>
+            </a:r>
+          </a:p>
+        </p:txBody>
+      </p:sp>
+    </p:spTree>
+  </p:cSld>
+  <p:clrMapOvr>
+    <a:masterClrMapping/>
+  </p:clrMapOvr>
+</p:sld>
+</file>
+
+<file path=ppt/slides/slide4.xml><?xml version="1.0" encoding="utf-8"?>
+<p:sld xmlns:a="http://schemas.openxmlformats.org/drawingml/2006/main" xmlns:p="http://schemas.openxmlformats.org/presentationml/2006/main" xmlns:r="http://schemas.openxmlformats.org/officeDocument/2006/relationships">
+  <p:cSld>
+    <p:spTree>
+      <p:nvGrpSpPr>
+        <p:cNvPr id="1" name=""/>
+        <p:cNvGrpSpPr/>
+        <p:nvPr/>
+      </p:nvGrpSpPr>
+      <p:grpSpPr/>
+      <p:sp>
+        <p:nvSpPr>
+          <p:cNvPr id="3" name="TextBox 2"/>
+          <p:cNvSpPr txBox="1"/>
+          <p:nvPr/>
+        </p:nvSpPr>
+        <p:spPr>
+          <a:xfrm>
+            <a:off x="0" y="0"/>
+            <a:ext cx="6858000" cy="1713402"/>
+          </a:xfrm>
+          <a:prstGeom prst="rect">
+            <a:avLst/>
+          </a:prstGeom>
+          <a:noFill/>
+        </p:spPr>
+        <p:txBody>
+          <a:bodyPr wrap="none">
+            <a:spAutoFit/>
+          </a:bodyPr>
+          <a:lstStyle/>
+          <a:p>
+            <a:pPr algn="ctr">
+              <a:defRPr sz="1000"/>
+            </a:pPr>
+            <a:r>
+              <a:t>L'IA peut aider à personnaliser la formation en fonction des besoins spécifiques de chaque</a:t>
+            </a:r>
+            <a:br/>
+            <a:r>
+              <a:t>employé. C’est le cas avec l’entreprise Coursera qui utilise l'IA pour recommander des cours aux</a:t>
+            </a:r>
+            <a:br/>
+            <a:r>
+              <a:t>utilisateurs en fonction de leurs objectifs de carrière et de leurs compétences existantes. De</a:t>
+            </a:r>
+            <a:br/>
+            <a:r>
+              <a:t>plus, en amont de cette étape d’orientation, Il est possible de recourir à de l'IA pour analyser</a:t>
+            </a:r>
+            <a:br/>
+            <a:r>
+              <a:t>les données sur les performances des employés et identifier les moyens d'améliorer leur</a:t>
+            </a:r>
+            <a:br/>
+            <a:r>
+              <a:t>productivité et leur bien-être. Pour ce faire, Humanyze²⁰ notamment utilise l'IA pour analyser</a:t>
+            </a:r>
+            <a:br/>
+            <a:r>
+              <a:t>les données sur les interactions entre les employés, telles que les courriels et les réunions,</a:t>
+            </a:r>
+            <a:br/>
+            <a:r>
+              <a:t>afin d'identifier les modèles qui peuvent être utilisés pour améliorer la productivité. Ici,</a:t>
+            </a:r>
+            <a:br/>
+            <a:r>
+              <a:t>l’une des applications possibles se trouve être le soutien aux managers afin de leur permettre de</a:t>
+            </a:r>
+            <a:br/>
+            <a:r>
+              <a:t>comprendre comment les équipes travaillent ensemble et d’identifier les domaines qui pourraient</a:t>
+            </a:r>
+            <a:br/>
+            <a:r>
+              <a:t>être améliorés.</a:t>
+            </a:r>
+          </a:p>
+        </p:txBody>
+      </p:sp>
+      <p:sp>
+        <p:nvSpPr>
+          <p:cNvPr id="4" name="TextBox 3"/>
+          <p:cNvSpPr txBox="1"/>
+          <p:nvPr/>
+        </p:nvSpPr>
+        <p:spPr>
+          <a:xfrm>
+            <a:off x="138545" y="1713402"/>
+            <a:ext cx="6858000" cy="274320"/>
+          </a:xfrm>
+          <a:prstGeom prst="rect">
+            <a:avLst/>
+          </a:prstGeom>
+          <a:noFill/>
+        </p:spPr>
+        <p:txBody>
+          <a:bodyPr wrap="none">
+            <a:spAutoFit/>
+          </a:bodyPr>
+          <a:lstStyle/>
+          <a:p>
+            <a:pPr>
+              <a:defRPr sz="1100" b="1">
+                <a:solidFill>
+                  <a:schemeClr val="accent6"/>
+                </a:solidFill>
+              </a:defRPr>
+            </a:pPr>
+            <a:r>
+              <a:t>Finance et conseil</a:t>
+            </a:r>
+          </a:p>
+        </p:txBody>
+      </p:sp>
+      <p:sp>
+        <p:nvSpPr>
+          <p:cNvPr id="5" name="TextBox 4"/>
+          <p:cNvSpPr txBox="1"/>
+          <p:nvPr/>
+        </p:nvSpPr>
+        <p:spPr>
+          <a:xfrm>
+            <a:off x="0" y="1987722"/>
+            <a:ext cx="6858000" cy="1957712"/>
+          </a:xfrm>
+          <a:prstGeom prst="rect">
+            <a:avLst/>
+          </a:prstGeom>
+          <a:noFill/>
+        </p:spPr>
+        <p:txBody>
+          <a:bodyPr wrap="none">
+            <a:spAutoFit/>
+          </a:bodyPr>
+          <a:lstStyle/>
+          <a:p>
+            <a:pPr algn="ctr">
+              <a:defRPr sz="1000"/>
+            </a:pPr>
+            <a:r>
+              <a:t>Aux États-Unis l’un des exemples phares de l’union sacrée entre l’IA et la finance est Upstart,</a:t>
+            </a:r>
+            <a:br/>
+            <a:r>
+              <a:t>une plateforme de prêt en ligne qui utilise l'IA pour prédire la probabilité de remboursement</a:t>
+            </a:r>
+            <a:br/>
+            <a:r>
+              <a:t>d'un emprunteur en se basant sur un grand nombre de variables, au-delà de ce que les systèmes</a:t>
+            </a:r>
+            <a:br/>
+            <a:r>
+              <a:t>traditionnels de notation de crédit utilisent. Partant, il devient possible à Upstart de fournir</a:t>
+            </a:r>
+            <a:br/>
+            <a:r>
+              <a:t>des prêts à une plus grande variété d'emprunteurs. C’est une illustration de l’usage de l’IA par</a:t>
+            </a:r>
+            <a:br/>
+            <a:r>
+              <a:t>les institutions financières pour évaluer le risque de crédit, détecter les fraudes, automatiser</a:t>
+            </a:r>
+            <a:br/>
+            <a:r>
+              <a:t>les transactions et offrir des conseils financiers personnalisés. En outre, JP MORGAN s’est</a:t>
+            </a:r>
+            <a:br/>
+            <a:r>
+              <a:t>récemment illustré par la mise sur pied de Coin²¹, un programme basé sur l'intelligence</a:t>
+            </a:r>
+            <a:br/>
+            <a:r>
+              <a:t>artificielle. COIN utilise un réseau cloud privé pour analyser les contrats, réduisant ainsi le</a:t>
+            </a:r>
+            <a:br/>
+            <a:r>
+              <a:t>temps de traitement. Cette initiative a permis à JP Morgan de diminuer les erreurs de prêt</a:t>
+            </a:r>
+            <a:br/>
+            <a:r>
+              <a:t>causées par des erreurs d'interprétation humaine. Cette solution prétend même pouvoir réaliser</a:t>
+            </a:r>
+            <a:br/>
+            <a:r>
+              <a:t>360.000 tâches d’analyse financière en l’espace de quelques secondes.</a:t>
+            </a:r>
+          </a:p>
+        </p:txBody>
+      </p:sp>
+      <p:sp>
+        <p:nvSpPr>
+          <p:cNvPr id="2" name="Title 1"/>
+          <p:cNvSpPr>
+            <a:spLocks noGrp="1"/>
+          </p:cNvSpPr>
+          <p:nvPr>
+            <p:ph type="title"/>
+          </p:nvPr>
+        </p:nvSpPr>
+        <p:spPr>
+          <a:xfrm>
+            <a:off x="138545" y="3960434"/>
+            <a:ext cx="6557819" cy="400000"/>
+          </a:xfrm>
+        </p:spPr>
+        <p:txBody>
+          <a:bodyPr/>
+          <a:lstStyle/>
+          <a:p>
+            <a:pPr>
+              <a:defRPr b="1" i="1">
+                <a:solidFill>
+                  <a:schemeClr val="bg1"/>
+                </a:solidFill>
+              </a:defRPr>
+            </a:pPr>
+            <a:r>
+              <a:t>France</a:t>
+            </a:r>
+          </a:p>
+        </p:txBody>
+      </p:sp>
+      <p:sp>
+        <p:nvSpPr>
+          <p:cNvPr id="6" name="TextBox 5"/>
+          <p:cNvSpPr txBox="1"/>
+          <p:nvPr/>
+        </p:nvSpPr>
+        <p:spPr>
+          <a:xfrm>
+            <a:off x="138545" y="4375434"/>
+            <a:ext cx="6858000" cy="274320"/>
+          </a:xfrm>
+          <a:prstGeom prst="rect">
+            <a:avLst/>
+          </a:prstGeom>
+          <a:noFill/>
+        </p:spPr>
+        <p:txBody>
+          <a:bodyPr wrap="none">
+            <a:spAutoFit/>
+          </a:bodyPr>
+          <a:lstStyle/>
+          <a:p>
+            <a:pPr>
+              <a:defRPr sz="1100" b="1">
+                <a:solidFill>
+                  <a:schemeClr val="accent6"/>
+                </a:solidFill>
+              </a:defRPr>
+            </a:pPr>
+            <a:r>
+              <a:t>Electricité et énergie</a:t>
+            </a:r>
+          </a:p>
+        </p:txBody>
+      </p:sp>
+      <p:sp>
+        <p:nvSpPr>
+          <p:cNvPr id="7" name="TextBox 6"/>
+          <p:cNvSpPr txBox="1"/>
+          <p:nvPr/>
+        </p:nvSpPr>
+        <p:spPr>
+          <a:xfrm>
+            <a:off x="0" y="4649754"/>
+            <a:ext cx="6858000" cy="886766"/>
+          </a:xfrm>
+          <a:prstGeom prst="rect">
+            <a:avLst/>
+          </a:prstGeom>
+          <a:noFill/>
+        </p:spPr>
+        <p:txBody>
+          <a:bodyPr wrap="none">
+            <a:spAutoFit/>
+          </a:bodyPr>
+          <a:lstStyle/>
+          <a:p>
+            <a:pPr algn="ctr">
+              <a:defRPr sz="1000"/>
+            </a:pPr>
+            <a:r>
+              <a:t>EDF, l'un des leaders mondiaux dans le domaine de l'énergie, utilise l'IA²² pour accroitre</a:t>
+            </a:r>
+            <a:br/>
+            <a:r>
+              <a:t>significativement la production et la maintenance de ses installations nucléaires. Au moyen de</a:t>
+            </a:r>
+            <a:br/>
+            <a:r>
+              <a:t>solutions basées sur l'IA, EDF a la capacité de surveiller en temps réel le fonctionnement des</a:t>
+            </a:r>
+            <a:br/>
+            <a:r>
+              <a:t>réacteurs nucléaires et de prédire les besoins de maintenance. Fort de cela, il devient ainsi</a:t>
+            </a:r>
+            <a:br/>
+            <a:r>
+              <a:t>possible d'améliorer la sûreté de ses installations et d'optimiser la production d'énergie.</a:t>
+            </a:r>
+          </a:p>
+        </p:txBody>
+      </p:sp>
+      <p:sp>
+        <p:nvSpPr>
+          <p:cNvPr id="8" name="TextBox 7"/>
+          <p:cNvSpPr txBox="1"/>
+          <p:nvPr/>
+        </p:nvSpPr>
+        <p:spPr>
+          <a:xfrm>
+            <a:off x="138545" y="5536520"/>
+            <a:ext cx="6858000" cy="274320"/>
+          </a:xfrm>
+          <a:prstGeom prst="rect">
+            <a:avLst/>
+          </a:prstGeom>
+          <a:noFill/>
+        </p:spPr>
+        <p:txBody>
+          <a:bodyPr wrap="none">
+            <a:spAutoFit/>
+          </a:bodyPr>
+          <a:lstStyle/>
+          <a:p>
+            <a:pPr>
+              <a:defRPr sz="1100" b="1">
+                <a:solidFill>
+                  <a:schemeClr val="accent6"/>
+                </a:solidFill>
+              </a:defRPr>
+            </a:pPr>
+            <a:r>
+              <a:t>L'agriculture</a:t>
+            </a:r>
+          </a:p>
+        </p:txBody>
+      </p:sp>
+      <p:sp>
+        <p:nvSpPr>
+          <p:cNvPr id="9" name="TextBox 8"/>
+          <p:cNvSpPr txBox="1"/>
+          <p:nvPr/>
+        </p:nvSpPr>
+        <p:spPr>
+          <a:xfrm>
+            <a:off x="0" y="5810840"/>
+            <a:ext cx="6858000" cy="1216417"/>
+          </a:xfrm>
+          <a:prstGeom prst="rect">
+            <a:avLst/>
+          </a:prstGeom>
+          <a:noFill/>
+        </p:spPr>
+        <p:txBody>
+          <a:bodyPr wrap="none">
+            <a:spAutoFit/>
+          </a:bodyPr>
+          <a:lstStyle/>
+          <a:p>
+            <a:pPr algn="ctr">
+              <a:defRPr sz="1000"/>
+            </a:pPr>
+            <a:r>
+              <a:t>L'IA peut être utilisée pour améliorer l'efficacité et la durabilité de l'agriculture. Et c’est</a:t>
+            </a:r>
+            <a:br/>
+            <a:r>
+              <a:t>notamment le cas en France avec Dilepix, une start-up qui développe des outils d'IA pour</a:t>
+            </a:r>
+            <a:br/>
+            <a:r>
+              <a:t>l'agriculture de précision. En utilisant des images provenant de drones, de satellites ou de</a:t>
+            </a:r>
+            <a:br/>
+            <a:r>
+              <a:t>caméras installées sur le terrain, Dilepix²³ a la capacité de surveiller avec une précisions</a:t>
+            </a:r>
+            <a:br/>
+            <a:r>
+              <a:t>optimale les cultures et détecter rapidement les problèmes tels que les maladies ou les</a:t>
+            </a:r>
+            <a:br/>
+            <a:r>
+              <a:t>infestations de parasites. L’idée ici est de permettre aux agriculteurs d'intervenir plus</a:t>
+            </a:r>
+            <a:br/>
+            <a:r>
+              <a:t>rapidement et de manière plus ciblée, pour in fine améliorer les rendements et réduit</a:t>
+            </a:r>
+            <a:br/>
+            <a:r>
+              <a:t>l'utilisation de pesticides.</a:t>
+            </a:r>
+          </a:p>
+        </p:txBody>
+      </p:sp>
+      <p:sp>
+        <p:nvSpPr>
+          <p:cNvPr id="2" name="Title 1"/>
+          <p:cNvSpPr>
+            <a:spLocks noGrp="1"/>
+          </p:cNvSpPr>
+          <p:nvPr>
+            <p:ph type="title"/>
+          </p:nvPr>
+        </p:nvSpPr>
+        <p:spPr>
+          <a:xfrm>
+            <a:off x="138545" y="7042257"/>
+            <a:ext cx="6557819" cy="400000"/>
+          </a:xfrm>
+        </p:spPr>
+        <p:txBody>
+          <a:bodyPr/>
+          <a:lstStyle/>
+          <a:p>
+            <a:pPr>
+              <a:defRPr b="1" i="1">
+                <a:solidFill>
+                  <a:schemeClr val="bg1"/>
+                </a:solidFill>
+              </a:defRPr>
+            </a:pPr>
+            <a:r>
+              <a:t>Grande-Bretagne</a:t>
+            </a:r>
+          </a:p>
+        </p:txBody>
+      </p:sp>
+      <p:sp>
+        <p:nvSpPr>
+          <p:cNvPr id="10" name="TextBox 9"/>
+          <p:cNvSpPr txBox="1"/>
+          <p:nvPr/>
+        </p:nvSpPr>
+        <p:spPr>
+          <a:xfrm>
+            <a:off x="138545" y="7457257"/>
+            <a:ext cx="6858000" cy="274320"/>
+          </a:xfrm>
+          <a:prstGeom prst="rect">
+            <a:avLst/>
+          </a:prstGeom>
+          <a:noFill/>
+        </p:spPr>
+        <p:txBody>
+          <a:bodyPr wrap="none">
+            <a:spAutoFit/>
+          </a:bodyPr>
+          <a:lstStyle/>
+          <a:p>
+            <a:pPr>
+              <a:defRPr sz="1100" b="1">
+                <a:solidFill>
+                  <a:schemeClr val="accent6"/>
+                </a:solidFill>
+              </a:defRPr>
+            </a:pPr>
+            <a:r>
+              <a:t>L’éducation et IA</a:t>
+            </a:r>
+          </a:p>
+        </p:txBody>
+      </p:sp>
+      <p:sp>
+        <p:nvSpPr>
+          <p:cNvPr id="11" name="TextBox 10"/>
+          <p:cNvSpPr txBox="1"/>
+          <p:nvPr/>
+        </p:nvSpPr>
+        <p:spPr>
+          <a:xfrm>
+            <a:off x="0" y="7731577"/>
+            <a:ext cx="6858000" cy="868359"/>
+          </a:xfrm>
+          <a:prstGeom prst="rect">
+            <a:avLst/>
+          </a:prstGeom>
+          <a:noFill/>
+        </p:spPr>
+        <p:txBody>
+          <a:bodyPr wrap="none">
+            <a:spAutoFit/>
+          </a:bodyPr>
+          <a:lstStyle/>
+          <a:p>
+            <a:pPr algn="ctr">
+              <a:defRPr sz="1000"/>
+            </a:pPr>
+            <a:r>
+              <a:t>L'IA est capable d’analyser les performances des élèves et d’ajuster le matériel pédagogique en</a:t>
+            </a:r>
+            <a:br/>
+            <a:r>
+              <a:t>fonction de leurs forces et de leurs faiblesses. Il devient dès lors possible de développer des</a:t>
+            </a:r>
+            <a:br/>
+            <a:r>
+              <a:t>plateformes d'apprentissage en ligne qui utilise l'IA pour adapter le contenu d'apprentissage aux</a:t>
+            </a:r>
+            <a:br/>
+            <a:r>
+              <a:t>besoins spécifiques de chaque étudiant. C’est en plein dans cette dynamique que Century Tech²⁴ </a:t>
+            </a:r>
+            <a:br/>
+            <a:r>
+              <a:t>utilise l'IA pour fournir un apprentissage personnalisé outre-manche.</a:t>
+            </a:r>
+          </a:p>
+        </p:txBody>
+      </p:sp>
+      <p:sp>
+        <p:nvSpPr>
+          <p:cNvPr id="12" name="TextBox 11"/>
+          <p:cNvSpPr txBox="1"/>
+          <p:nvPr/>
+        </p:nvSpPr>
+        <p:spPr>
+          <a:xfrm>
+            <a:off x="138545" y="8599936"/>
+            <a:ext cx="6858000" cy="274320"/>
+          </a:xfrm>
+          <a:prstGeom prst="rect">
+            <a:avLst/>
+          </a:prstGeom>
+          <a:noFill/>
+        </p:spPr>
+        <p:txBody>
+          <a:bodyPr wrap="none">
+            <a:spAutoFit/>
+          </a:bodyPr>
+          <a:lstStyle/>
+          <a:p>
+            <a:pPr>
+              <a:defRPr sz="1100" b="1">
+                <a:solidFill>
+                  <a:schemeClr val="accent6"/>
+                </a:solidFill>
+              </a:defRPr>
+            </a:pPr>
+            <a:r>
+              <a:t>La finance</a:t>
+            </a:r>
+          </a:p>
+        </p:txBody>
+      </p:sp>
+    </p:spTree>
+  </p:cSld>
+  <p:clrMapOvr>
+    <a:masterClrMapping/>
+  </p:clrMapOvr>
+</p:sld>
+</file>
+
+<file path=ppt/slides/slide5.xml><?xml version="1.0" encoding="utf-8"?>
+<p:sld xmlns:a="http://schemas.openxmlformats.org/drawingml/2006/main" xmlns:p="http://schemas.openxmlformats.org/presentationml/2006/main" xmlns:r="http://schemas.openxmlformats.org/officeDocument/2006/relationships">
+  <p:cSld>
+    <p:spTree>
+      <p:nvGrpSpPr>
+        <p:cNvPr id="1" name=""/>
+        <p:cNvGrpSpPr/>
+        <p:nvPr/>
+      </p:nvGrpSpPr>
+      <p:grpSpPr/>
+      <p:sp>
+        <p:nvSpPr>
+          <p:cNvPr id="3" name="TextBox 2"/>
+          <p:cNvSpPr txBox="1"/>
+          <p:nvPr/>
+        </p:nvSpPr>
+        <p:spPr>
+          <a:xfrm>
+            <a:off x="0" y="0"/>
+            <a:ext cx="6858000" cy="1566147"/>
+          </a:xfrm>
+          <a:prstGeom prst="rect">
+            <a:avLst/>
+          </a:prstGeom>
+          <a:noFill/>
+        </p:spPr>
+        <p:txBody>
+          <a:bodyPr wrap="none">
+            <a:spAutoFit/>
+          </a:bodyPr>
+          <a:lstStyle/>
+          <a:p>
+            <a:pPr algn="ctr">
+              <a:defRPr sz="1000"/>
+            </a:pPr>
+            <a:r>
+              <a:t>Le contexte du secteur financier au Royaume-Uni est un terreau fertile à l’implantation de l’IA.</a:t>
+            </a:r>
+            <a:br/>
+            <a:r>
+              <a:t>Très avancé avec un centre financier mondial et de nombreuses entreprises y utilisant l'IA pour</a:t>
+            </a:r>
+            <a:br/>
+            <a:r>
+              <a:t>améliorer leurs services, leur efficacité opérationnelle et les services aux clients, la</a:t>
+            </a:r>
+            <a:br/>
+            <a:r>
+              <a:t>Grande-Bretagne est un exemple de choix. L’un des cas d’école est l’entreprise Revolut, qui</a:t>
+            </a:r>
+            <a:br/>
+            <a:r>
+              <a:t>utilise l'IA pour offrir des services bancaires personnalisés.²⁵ Ils utilisent l'apprentissage</a:t>
+            </a:r>
+            <a:br/>
+            <a:r>
+              <a:t>automatique pour analyser les habitudes de dépenses des clients, ce qui leur permet de proposer</a:t>
+            </a:r>
+            <a:br/>
+            <a:r>
+              <a:t>des produits financiers adaptés aux besoins individuels. L'IA est également utilisée pour</a:t>
+            </a:r>
+            <a:br/>
+            <a:r>
+              <a:t>détecter les transactions frauduleuses et améliorer la sécurité des comptes clients. Ces</a:t>
+            </a:r>
+            <a:br/>
+            <a:r>
+              <a:t>améliorations contribuent à améliorer l'expérience utilisateur et à renforcer la confiance dans</a:t>
+            </a:r>
+            <a:br/>
+            <a:r>
+              <a:t>les services financiers en ligne</a:t>
+            </a:r>
+          </a:p>
+        </p:txBody>
+      </p:sp>
+      <p:sp>
+        <p:nvSpPr>
+          <p:cNvPr id="4" name="TextBox 3"/>
+          <p:cNvSpPr txBox="1"/>
+          <p:nvPr/>
+        </p:nvSpPr>
+        <p:spPr>
+          <a:xfrm>
+            <a:off x="138545" y="1566147"/>
+            <a:ext cx="6858000" cy="274320"/>
+          </a:xfrm>
+          <a:prstGeom prst="rect">
+            <a:avLst/>
+          </a:prstGeom>
+          <a:noFill/>
+        </p:spPr>
+        <p:txBody>
+          <a:bodyPr wrap="none">
+            <a:spAutoFit/>
+          </a:bodyPr>
+          <a:lstStyle/>
+          <a:p>
+            <a:pPr>
+              <a:defRPr sz="1100" b="1">
+                <a:solidFill>
+                  <a:schemeClr val="accent6"/>
+                </a:solidFill>
+              </a:defRPr>
+            </a:pPr>
+            <a:r>
+              <a:t>Le commerce électronique</a:t>
+            </a:r>
+          </a:p>
+        </p:txBody>
+      </p:sp>
+      <p:sp>
+        <p:nvSpPr>
+          <p:cNvPr id="5" name="TextBox 4"/>
+          <p:cNvSpPr txBox="1"/>
+          <p:nvPr/>
+        </p:nvSpPr>
+        <p:spPr>
+          <a:xfrm>
+            <a:off x="0" y="1840467"/>
+            <a:ext cx="6858000" cy="652497"/>
+          </a:xfrm>
+          <a:prstGeom prst="rect">
+            <a:avLst/>
+          </a:prstGeom>
+          <a:noFill/>
+        </p:spPr>
+        <p:txBody>
+          <a:bodyPr wrap="none">
+            <a:spAutoFit/>
+          </a:bodyPr>
+          <a:lstStyle/>
+          <a:p>
+            <a:pPr algn="ctr">
+              <a:defRPr sz="1000"/>
+            </a:pPr>
+            <a:r>
+              <a:t>Ocado,²⁶ l'une des plus grandes entreprises de commerce électronique du Royaume-Uni, utilise l'IA</a:t>
+            </a:r>
+            <a:br/>
+            <a:r>
+              <a:t>pour optimiser ses opérations de stockage et de livraison. Ils ont développé un système de</a:t>
+            </a:r>
+            <a:br/>
+            <a:r>
+              <a:t>gestion d'entrepôt intelligent qui utilise l'IA pour prédire les besoins en stock et optimiser le</a:t>
+            </a:r>
+            <a:br/>
+            <a:r>
+              <a:t>placement des produits dans l'entrepôt.</a:t>
+            </a:r>
+          </a:p>
+        </p:txBody>
+      </p:sp>
+      <p:sp>
+        <p:nvSpPr>
+          <p:cNvPr id="6" name="TextBox 5"/>
+          <p:cNvSpPr txBox="1"/>
+          <p:nvPr/>
+        </p:nvSpPr>
+        <p:spPr>
+          <a:xfrm>
+            <a:off x="0" y="2492964"/>
+            <a:ext cx="6858000" cy="274320"/>
+          </a:xfrm>
+          <a:prstGeom prst="rect">
+            <a:avLst/>
+          </a:prstGeom>
+          <a:noFill/>
+        </p:spPr>
+        <p:txBody>
+          <a:bodyPr wrap="none">
+            <a:spAutoFit/>
+          </a:bodyPr>
+          <a:lstStyle/>
+          <a:p>
+            <a:pPr algn="ctr">
+              <a:defRPr sz="1000"/>
+            </a:pPr>
+            <a:r>
+              <a:t>endnote1)</a:t>
             </a:r>
           </a:p>
         </p:txBody>

</xml_diff>

<commit_message>
rectifies footnotes count bug
</commit_message>
<xml_diff>
--- a/powerpoints/test.pptx
+++ b/powerpoints/test.pptx
@@ -8,6 +8,8 @@
     <p:sldId id="259" r:id="rId5"/>
     <p:sldId id="261" r:id="rId11"/>
     <p:sldId id="262" r:id="rId12"/>
+    <p:sldId id="263" r:id="rId13"/>
+    <p:sldId id="264" r:id="rId14"/>
     <p:sldId id="260" r:id="rId6"/>
   </p:sldIdLst>
   <p:sldSz cx="6858000" cy="9144000" type="letter"/>
@@ -2141,7 +2143,7 @@
           <a:lstStyle/>
           <a:p>
             <a:r>
-              <a:t>Edge computing</a:t>
+              <a:t>Article de veille sur l’ automatisation robotisée des processus</a:t>
             </a:r>
           </a:p>
         </p:txBody>
@@ -2195,7 +2197,7 @@
           <a:lstStyle/>
           <a:p>
             <a:r>
-              <a:t>À la merci de tous</a:t>
+              <a:t>Le savoir faire par et pour la robotique</a:t>
             </a:r>
           </a:p>
         </p:txBody>
@@ -2230,7 +2232,7 @@
               </a:defRPr>
             </a:pPr>
             <a:r>
-              <a:t>Qu’est-ce que l’informatique de périphérie ?</a:t>
+              <a:t>Qu’est ce que la RPA?</a:t>
             </a:r>
           </a:p>
         </p:txBody>
@@ -2244,7 +2246,7 @@
         <p:spPr>
           <a:xfrm>
             <a:off x="0" y="3274320"/>
-            <a:ext cx="6858000" cy="1032348"/>
+            <a:ext cx="6858000" cy="1112669"/>
           </a:xfrm>
           <a:prstGeom prst="rect">
             <a:avLst/>
@@ -2261,27 +2263,31 @@
               <a:defRPr sz="1000"/>
             </a:pPr>
             <a:r>
-              <a:t>L’informatique de périphérie, ou Edge Computing, est un paradigme informatique visant à rendre</a:t>
-            </a:r>
-            <a:br/>
-            <a:r>
-              <a:t>plus efficace les systèmes utilisant l’infonuagique. Alors que la tendance chez les grandes</a:t>
-            </a:r>
-            <a:br/>
-            <a:r>
-              <a:t>entreprises est généralement de centraliser les infrastructures informatiques sur un serveur dans</a:t>
-            </a:r>
-            <a:br/>
-            <a:r>
-              <a:t>le nuage¹, l’informatique de périphérie consiste plutôt à traiter les données à proximité de leur</a:t>
-            </a:r>
-            <a:br/>
-            <a:r>
-              <a:t>source. Cela a plusieurs avantages tels qu’un temps de réponse plus rapide, une moins grande</a:t>
-            </a:r>
-            <a:br/>
-            <a:r>
-              <a:t>dépendance au réseau et une utilisation plus économique de la bande passante.</a:t>
+              <a:t>La Robotic Process Automation (RPA), ou automatisation robotisée des processus, représente une</a:t>
+            </a:r>
+            <a:br/>
+            <a:r>
+              <a:t>forme d'automatisation utilisant des technologies spécifiques pour reproduire les tâches</a:t>
+            </a:r>
+            <a:br/>
+            <a:r>
+              <a:t>administratives généralement effectuées par les humains. L'automatisation obtenue par RPA repose</a:t>
+            </a:r>
+            <a:br/>
+            <a:r>
+              <a:t>sur des logiciels régis par des règles pour accomplir des activités de processus métier à grande</a:t>
+            </a:r>
+            <a:br/>
+            <a:r>
+              <a:t>échelle. Ces tâches peuvent comprendre l'extraction de données, le remplissage de formulaire ou</a:t>
+            </a:r>
+            <a:br/>
+            <a:r>
+              <a:t>encore le transfert de fichiers¹.  Ces exemples ne sont que la pointe de l’iceberg de tout le</a:t>
+            </a:r>
+            <a:br/>
+            <a:r>
+              <a:t>potentiel que représente les RPA.</a:t>
             </a:r>
           </a:p>
         </p:txBody>
@@ -2294,7 +2300,7 @@
         </p:nvSpPr>
         <p:spPr>
           <a:xfrm>
-            <a:off x="138545" y="4306668"/>
+            <a:off x="138545" y="4386989"/>
             <a:ext cx="6858000" cy="274320"/>
           </a:xfrm>
           <a:prstGeom prst="rect">
@@ -2316,7 +2322,7 @@
               </a:defRPr>
             </a:pPr>
             <a:r>
-              <a:t>Pourquoi est-ce nécessaire ?</a:t>
+              <a:t>Qu’est ce qui ne peut pas être considéré comme de la RPA?</a:t>
             </a:r>
           </a:p>
         </p:txBody>
@@ -2329,8 +2335,8 @@
         </p:nvSpPr>
         <p:spPr>
           <a:xfrm>
-            <a:off x="0" y="4580988"/>
-            <a:ext cx="6858000" cy="1922571"/>
+            <a:off x="0" y="4661309"/>
+            <a:ext cx="6858000" cy="1136096"/>
           </a:xfrm>
           <a:prstGeom prst="rect">
             <a:avLst/>
@@ -2347,90 +2353,31 @@
               <a:defRPr sz="1000"/>
             </a:pPr>
             <a:r>
-              <a:t>Malgré qu’Internet soit très rapide, car les données voyagent à la vitesse de la lumière, ce</a:t>
-            </a:r>
-            <a:br/>
-            <a:r>
-              <a:t>n’est pas instantané, et sur de longues distances, cela peut impacter la vitesse de traitement de</a:t>
-            </a:r>
-            <a:br/>
-            <a:r>
-              <a:t>l’information. Certains usages de l’informatique nécessitent un temps de réponse presque</a:t>
-            </a:r>
-            <a:br/>
-            <a:r>
-              <a:t>instantané et ne peuvent pas supporter qu’il y ait de la latence. Pour pallier cela, des</a:t>
-            </a:r>
-            <a:br/>
-            <a:r>
-              <a:t>entreprises vont installer des machines en périphérie. C’est-à-dire qu’au lieu d’utiliser un</a:t>
-            </a:r>
-            <a:br/>
-            <a:r>
-              <a:t>serveur central, il y a un serveur à proximité de chaque infrastructure. L’informatique de</a:t>
-            </a:r>
-            <a:br/>
-            <a:r>
-              <a:t>périphérie est utile dans différents cas, notamment pour les entreprises qui ont des services</a:t>
-            </a:r>
-            <a:br/>
-            <a:r>
-              <a:t>numériques éparpillés dans plusieurs endroits et qui veulent que leurs services soient</a:t>
-            </a:r>
-            <a:br/>
-            <a:r>
-              <a:t>extrêmement rapides peu importe l’emplacement de l’utilisateur. Au lieu que les données soient</a:t>
-            </a:r>
-            <a:br/>
-            <a:r>
-              <a:t>toujours envoyées sur un serveur central, qui est potentiellement éloigné géographiquement, les</a:t>
-            </a:r>
-            <a:br/>
-            <a:r>
-              <a:t>données sont traitées sur une machine à proximité, évitant de devoir traverser de longues</a:t>
-            </a:r>
-            <a:br/>
-            <a:r>
-              <a:t>distances et réduisant la latence dans le traitement de l’information.</a:t>
-            </a:r>
-          </a:p>
-        </p:txBody>
-      </p:sp>
-      <p:sp>
-        <p:nvSpPr>
-          <p:cNvPr id="16" name="Titre 15">
-            <a:extLst>
-              <a:ext uri="{FF2B5EF4-FFF2-40B4-BE49-F238E27FC236}">
-                <a16:creationId xmlns:a16="http://schemas.microsoft.com/office/drawing/2014/main" id="{BD9AAE16-B73A-D858-F17D-47FE778FF175}"/>
-              </a:ext>
-            </a:extLst>
-          </p:cNvPr>
-          <p:cNvSpPr>
-            <a:spLocks noGrp="1"/>
-          </p:cNvSpPr>
-          <p:nvPr>
-            <p:ph type="title"/>
-          </p:nvPr>
-        </p:nvSpPr>
-        <p:spPr>
-          <a:xfrm>
-            <a:off x="163195" y="6518559"/>
-            <a:ext cx="6567054" cy="400000"/>
-          </a:xfrm>
-        </p:spPr>
-        <p:txBody>
-          <a:bodyPr/>
-          <a:lstStyle/>
-          <a:p>
-            <a:pPr>
-              <a:defRPr b="1" i="1">
-                <a:solidFill>
-                  <a:schemeClr val="bg1"/>
-                </a:solidFill>
-              </a:defRPr>
-            </a:pPr>
-            <a:r>
-              <a:t>Canada</a:t>
+              <a:t>La RPA s’insère généralement dans des processus plus vastes d’hyperautomatisation qui, eux,</a:t>
+            </a:r>
+            <a:br/>
+            <a:r>
+              <a:t>couvrent un spectre beaucoup plus large sur lequel nous ne nous appesantirons pas longtemps. En</a:t>
+            </a:r>
+            <a:br/>
+            <a:r>
+              <a:t>effet, l’hyperautomatisation² se réfère à l’utilisation de technologies diverses et variées, au</a:t>
+            </a:r>
+            <a:br/>
+            <a:r>
+              <a:t>nombre desquelles l’intelligence artificielle, l’apprentissage automatique ou encore la RPA, pour</a:t>
+            </a:r>
+            <a:br/>
+            <a:r>
+              <a:t>automatiser les tâches et processus de métiers exercés communément par des humains. L’on comprend</a:t>
+            </a:r>
+            <a:br/>
+            <a:r>
+              <a:t>que la RPA se positionne uniquement comme un maillon, là où l’hyperautomatisation représente une</a:t>
+            </a:r>
+            <a:br/>
+            <a:r>
+              <a:t>chaîne plus globale de transformation.</a:t>
             </a:r>
           </a:p>
         </p:txBody>
@@ -2443,8 +2390,8 @@
         </p:nvSpPr>
         <p:spPr>
           <a:xfrm>
-            <a:off x="0" y="6933559"/>
-            <a:ext cx="6858000" cy="2059786"/>
+            <a:off x="0" y="5797405"/>
+            <a:ext cx="6858000" cy="1686629"/>
           </a:xfrm>
           <a:prstGeom prst="rect">
             <a:avLst/>
@@ -2461,55 +2408,43 @@
               <a:defRPr sz="1000"/>
             </a:pPr>
             <a:r>
-              <a:t>CENGN, une organisation basée à Ottawa, possède une serre intelligente en Ontario qui utilise</a:t>
-            </a:r>
-            <a:br/>
-            <a:r>
-              <a:t>l’Internet des objets pour s’automatiser, servant de laboratoire pour que les compagnies œuvrant</a:t>
-            </a:r>
-            <a:br/>
-            <a:r>
-              <a:t>dans le domaine des technologies de l’agriculture puissent prototyper². L’infrastructure récolte</a:t>
-            </a:r>
-            <a:br/>
-            <a:r>
-              <a:t>constamment des données comme l’humidité, la température et des images provenant d’objets</a:t>
-            </a:r>
-            <a:br/>
-            <a:r>
-              <a:t>connectés. Le CENGN utilise l’informatique de périphérie pour traiter ces données sur des</a:t>
-            </a:r>
-            <a:br/>
-            <a:r>
-              <a:t>serveurs mis en place directement sur le site de la serre. Les serveurs utilisent ces données</a:t>
-            </a:r>
-            <a:br/>
-            <a:r>
-              <a:t>pour prendre une décision et renvoie une réponse aux objets connectés en conséquence. Malgré que</a:t>
-            </a:r>
-            <a:br/>
-            <a:r>
-              <a:t>ce ne soit qu’un prototype, l’organisation croit que les futures serres intelligentes utiliseront</a:t>
-            </a:r>
-            <a:br/>
-            <a:r>
-              <a:t>l’informatique de périphérie plutôt que d’utiliser un fournisseur infonuagique certainement situé</a:t>
-            </a:r>
-            <a:br/>
-            <a:r>
-              <a:t>plus loin géographiquement. Au lieu que les données fassent des aller-retours sur de longues</a:t>
-            </a:r>
-            <a:br/>
-            <a:r>
-              <a:t>distances, cela fait en sorte que les données provenant des capteurs de la serre ont une très</a:t>
-            </a:r>
-            <a:br/>
-            <a:r>
-              <a:t>petite distance à parcourir avant d’être analysés, donc une plus petite latence et une</a:t>
-            </a:r>
-            <a:br/>
-            <a:r>
-              <a:t>utilisation moins gourmande du réseau.</a:t>
+              <a:t>C’est en cela que, bien souvent, cette technologie est confondue à tort avec des technologies qui</a:t>
+            </a:r>
+            <a:br/>
+            <a:r>
+              <a:t>lui sont voisines. Il est ainsi courant de constater un amalgame entre la RPA et l'Intelligence</a:t>
+            </a:r>
+            <a:br/>
+            <a:r>
+              <a:t>Artificielle (IA) ou encore entre la RPA et l’automatisation intelligente de processus³, alors</a:t>
+            </a:r>
+            <a:br/>
+            <a:r>
+              <a:t>qu’il s’agit deux notions pourtant distinctes. L'IA embrasse des concepts tels que</a:t>
+            </a:r>
+            <a:br/>
+            <a:r>
+              <a:t>l'automatisation cognitive, l'apprentissage automatique (ou Machine Learning), le traitement du</a:t>
+            </a:r>
+            <a:br/>
+            <a:r>
+              <a:t>langage naturel, la réflexion, ainsi que la génération et l'analyse d'hypothèses. La distinction</a:t>
+            </a:r>
+            <a:br/>
+            <a:r>
+              <a:t>fondamentale réside dans l'orientation respective de la RPA et de l'IA : la première est axée sur</a:t>
+            </a:r>
+            <a:br/>
+            <a:r>
+              <a:t>les processus, la seconde sur les données. Les robots opérant par RPA se conforment exclusivement</a:t>
+            </a:r>
+            <a:br/>
+            <a:r>
+              <a:t>aux processus préétablis par un utilisateurlà où l'IA aspire à imiter ou à émuler l'intelligence</a:t>
+            </a:r>
+            <a:br/>
+            <a:r>
+              <a:t>humaine, la RPA elle a pour objectif de reproduire les tâches prescrites par l’humain.</a:t>
             </a:r>
           </a:p>
         </p:txBody>
@@ -2773,7 +2708,7 @@
               <a:rPr>
                 <a:hlinkClick r:id="rId3"/>
               </a:rPr>
-              <a:t>https://explodingtopics.com/blog/corporate-cloud-data</a:t>
+              <a:t>Aguirre, S., Rodriguez, A. Automation of a business process using robotic process automation (RPA): A case study. link.springer.com/chapter/10.1007/978-3-319-66963-2_7</a:t>
             </a:r>
           </a:p>
           <a:p>
@@ -2788,7 +2723,7 @@
               <a:rPr>
                 <a:hlinkClick r:id="rId4"/>
               </a:rPr>
-              <a:t>www.cengn.ca/services/commercialization-services/smart-agriculture-program/</a:t>
+              <a:t>https://www.scielo.br/j/jistm/a/8BnnjHkvFGrmBFdtnXmhNtC/?lang=en</a:t>
             </a:r>
             <a:endParaRPr lang="en-US" sz="800" dirty="0">
               <a:solidFill>
@@ -2810,7 +2745,7 @@
               <a:rPr>
                 <a:hlinkClick r:id="rId5"/>
               </a:rPr>
-              <a:t>www.cloudflare.com/application-services/</a:t>
+              <a:t>https://ieeexplore.ieee.org/abstract/document/9676222</a:t>
             </a:r>
           </a:p>
           <a:p>
@@ -2825,7 +2760,7 @@
               <a:rPr>
                 <a:hlinkClick r:id="rId6"/>
               </a:rPr>
-              <a:t>vercel.com/docs/concepts/edge-network/overview</a:t>
+              <a:t>Balasundaram, S., Venkatagiri, S. A structured approach to implementing Robotic Process Automation in HR. &lt;a href="https://iopscience.iop.org/article/10.1088/1742-6596/1427/1/012008/meta"&gt;iopscience.iop.org&lt;/a&gt;</a:t>
             </a:r>
             <a:endParaRPr lang="en-US" sz="800" dirty="0">
               <a:solidFill>
@@ -2847,7 +2782,7 @@
               <a:rPr>
                 <a:hlinkClick r:id="rId7"/>
               </a:rPr>
-              <a:t>www.iothub.com.au/news/chevron-scales-up-industrial-iot-pilot-513758</a:t>
+              <a:t>https://www.ey.com/en_ca/consulting/digital-identity/can-transforming-your-digital-identity-system-fuel-your-bottom-line?WT.mc_id=10815001&amp;AA.tsrc=paidsearch&amp;gad=1&amp;gclid=Cj0KCQjwzdOlBhCNARIsAPMwjbx-oSsdw6QIyIutQuWSswQq31SRX2mFb__dz0pmyrY8QT4zm4kuUjIaAjjlEALw_wcB&amp;gclsrc=aw.ds</a:t>
             </a:r>
             <a:endParaRPr lang="fr-FR" sz="800" b="0" i="0" dirty="0">
               <a:solidFill>
@@ -2869,7 +2804,7 @@
               <a:rPr>
                 <a:hlinkClick r:id="rId8"/>
               </a:rPr>
-              <a:t>https://www.datacenterknowledge.com/microsoft/how-microsoft-extending-its-cloud-chevron-s-oil-fields</a:t>
+              <a:t>https://www.rbcits.com/fr/insights/2018/12/rpa_leveraging_automation_while_managing_risk?utm_source=home&amp;utm_medium=carousel</a:t>
             </a:r>
             <a:endParaRPr lang="en-US" sz="800" dirty="0">
               <a:solidFill>
@@ -2890,7 +2825,7 @@
               <a:rPr>
                 <a:hlinkClick r:id="rId9"/>
               </a:rPr>
-              <a:t>www.lepoint.fr/services/menta-le-leader-europeen-de-la-reprogrammation-hardware-embarquee-28-03-2022-2469874_4345.php</a:t>
+              <a:t>https://www.telusinternational.com/solutions/back-office/robotic-process-automation</a:t>
             </a:r>
             <a:endParaRPr lang="en-US" sz="800" dirty="0">
               <a:solidFill>
@@ -2911,7 +2846,7 @@
               <a:rPr>
                 <a:hlinkClick r:id="rId10"/>
               </a:rPr>
-              <a:t>ori.co/multicloud-networking</a:t>
+              <a:t>https://www.huratips.com/shopify-services/shopify-app-installation.php?app=shopflex</a:t>
             </a:r>
             <a:endParaRPr lang="en-US" sz="800" dirty="0">
               <a:solidFill>
@@ -2932,7 +2867,7 @@
               <a:rPr>
                 <a:hlinkClick r:id="rId11"/>
               </a:rPr>
-              <a:t>zededa.com/products/</a:t>
+              <a:t>https://blog.hettshow.co.uk/cleveland-clinic-cutting-waiting-times-with-robotic-process-automation</a:t>
             </a:r>
             <a:endParaRPr lang="en-US" sz="800" dirty="0">
               <a:solidFill>
@@ -2953,7 +2888,7 @@
               <a:rPr>
                 <a:hlinkClick r:id="rId12"/>
               </a:rPr>
-              <a:t>https://www.stengg.com/en/digital-tech/data-science-analytics-and-ai/video-analytics/</a:t>
+              <a:t>https://www.ibm.com/products/robotic-process-automation?utm_content=SRCWW&amp;p1=Search&amp;p4=43700074488263025&amp;p5=p&amp;gclid=Cj0KCQjwzdOlBhCNARIsAPMwjbygX1wd3nUB1kWH3peypGOq6ak-7kPGZffSHI9I4dFEQuVS1cMZOzEaAuvnEALw_wcB&amp;gclsrc=aw.ds</a:t>
             </a:r>
             <a:endParaRPr lang="en-US" sz="800" dirty="0">
               <a:solidFill>
@@ -2974,7 +2909,7 @@
               <a:rPr>
                 <a:hlinkClick r:id="rId13"/>
               </a:rPr>
-              <a:t>https://www.stengg.com/en/digital-tech/data-science-analytics-and-ai/edge-analytics/</a:t>
+              <a:t>https://retailminded.com/how-robotic-process-automation-can-contribute-to-retail-growth/</a:t>
             </a:r>
             <a:endParaRPr lang="en-US" sz="800" dirty="0">
               <a:solidFill>
@@ -2989,16 +2924,13 @@
                 <a:spcPct val="100000"/>
               </a:lnSpc>
               <a:buAutoNum type="arabicPeriod"/>
-            </a:pPr>
-            <a:r>
-              <a:rPr lang="en-US" sz="800" b="0" i="0" dirty="0">
-                <a:solidFill>
-                  <a:srgbClr val="000000"/>
-                </a:solidFill>
-                <a:effectLst/>
-                <a:latin typeface="+mj-lt"/>
+              <a:defRPr sz="800"/>
+            </a:pPr>
+            <a:r>
+              <a:rPr>
+                <a:hlinkClick r:id="rId14"/>
               </a:rPr>
-              <a:t>&lt;source&gt;</a:t>
+              <a:t>https://www.aphp.fr/connaitre-lap-hp/recherche-innovation/linnovation-lap-hp</a:t>
             </a:r>
             <a:endParaRPr lang="en-US" sz="800" dirty="0">
               <a:solidFill>
@@ -3013,16 +2945,13 @@
                 <a:spcPct val="100000"/>
               </a:lnSpc>
               <a:buAutoNum type="arabicPeriod"/>
-            </a:pPr>
-            <a:r>
-              <a:rPr lang="en-US" sz="800" b="0" i="0" dirty="0">
-                <a:solidFill>
-                  <a:srgbClr val="000000"/>
-                </a:solidFill>
-                <a:effectLst/>
-                <a:latin typeface="+mj-lt"/>
+              <a:defRPr sz="800"/>
+            </a:pPr>
+            <a:r>
+              <a:rPr>
+                <a:hlinkClick r:id="rId15"/>
               </a:rPr>
-              <a:t>&lt;source&gt;</a:t>
+              <a:t>https://techhq.com/2019/02/axa-saves-182k-in-six-months-with-rpa/</a:t>
             </a:r>
             <a:endParaRPr lang="en-US" sz="800" dirty="0">
               <a:solidFill>
@@ -3037,16 +2966,13 @@
                 <a:spcPct val="100000"/>
               </a:lnSpc>
               <a:buAutoNum type="arabicPeriod"/>
-            </a:pPr>
-            <a:r>
-              <a:rPr lang="en-US" sz="800" b="0" i="0" dirty="0">
-                <a:solidFill>
-                  <a:srgbClr val="000000"/>
-                </a:solidFill>
-                <a:effectLst/>
-                <a:latin typeface="+mj-lt"/>
+              <a:defRPr sz="800"/>
+            </a:pPr>
+            <a:r>
+              <a:rPr>
+                <a:hlinkClick r:id="rId16"/>
               </a:rPr>
-              <a:t>&lt;source&gt;</a:t>
+              <a:t>https://www.bearingpoint.com/fr-fr/publications-evenements/cas-clients/rpa-%C3%A0-la-dgfip-du-poc-%C3%A0-lindustrialisation/</a:t>
             </a:r>
             <a:endParaRPr lang="en-US" sz="800" dirty="0">
               <a:solidFill>
@@ -3061,16 +2987,13 @@
                 <a:spcPct val="100000"/>
               </a:lnSpc>
               <a:buAutoNum type="arabicPeriod"/>
-            </a:pPr>
-            <a:r>
-              <a:rPr lang="en-US" sz="800" b="0" i="0" dirty="0">
-                <a:solidFill>
-                  <a:srgbClr val="000000"/>
-                </a:solidFill>
-                <a:effectLst/>
-                <a:latin typeface="+mj-lt"/>
+              <a:defRPr sz="800"/>
+            </a:pPr>
+            <a:r>
+              <a:rPr>
+                <a:hlinkClick r:id="rId17"/>
               </a:rPr>
-              <a:t>&lt;source&gt;</a:t>
+              <a:t>https://www.blueprism.com/fr/</a:t>
             </a:r>
             <a:endParaRPr lang="en-US" sz="800" dirty="0">
               <a:solidFill>
@@ -3085,16 +3008,13 @@
                 <a:spcPct val="100000"/>
               </a:lnSpc>
               <a:buAutoNum type="arabicPeriod"/>
-            </a:pPr>
-            <a:r>
-              <a:rPr lang="en-US" sz="800" b="0" i="0" dirty="0">
-                <a:solidFill>
-                  <a:srgbClr val="000000"/>
-                </a:solidFill>
-                <a:effectLst/>
-                <a:latin typeface="+mj-lt"/>
+              <a:defRPr sz="800"/>
+            </a:pPr>
+            <a:r>
+              <a:rPr>
+                <a:hlinkClick r:id="rId18"/>
               </a:rPr>
-              <a:t>&lt;source&gt;</a:t>
+              <a:t>https://www.blueprism.com/fr/solutions/industry/</a:t>
             </a:r>
             <a:endParaRPr lang="en-US" sz="800" dirty="0">
               <a:solidFill>
@@ -3109,16 +3029,13 @@
                 <a:spcPct val="100000"/>
               </a:lnSpc>
               <a:buAutoNum type="arabicPeriod"/>
-            </a:pPr>
-            <a:r>
-              <a:rPr lang="en-US" sz="800" b="0" i="0" dirty="0">
-                <a:solidFill>
-                  <a:srgbClr val="000000"/>
-                </a:solidFill>
-                <a:effectLst/>
-                <a:latin typeface="+mj-lt"/>
+              <a:defRPr sz="800"/>
+            </a:pPr>
+            <a:r>
+              <a:rPr>
+                <a:hlinkClick r:id="rId19"/>
               </a:rPr>
-              <a:t>&lt;source&gt;</a:t>
+              <a:t>https://www.uipath.com/</a:t>
             </a:r>
             <a:endParaRPr lang="en-US" sz="800" dirty="0">
               <a:solidFill>
@@ -3133,16 +3050,13 @@
                 <a:spcPct val="100000"/>
               </a:lnSpc>
               <a:buAutoNum type="arabicPeriod"/>
-            </a:pPr>
-            <a:r>
-              <a:rPr lang="en-US" sz="800" b="0" i="0" dirty="0">
-                <a:solidFill>
-                  <a:srgbClr val="000000"/>
-                </a:solidFill>
-                <a:effectLst/>
-                <a:latin typeface="+mj-lt"/>
+              <a:defRPr sz="800"/>
+            </a:pPr>
+            <a:r>
+              <a:rPr>
+                <a:hlinkClick r:id="rId20"/>
               </a:rPr>
-              <a:t>&lt;source&gt;</a:t>
+              <a:t>https://www.uipath.com/solutions/industry/public-sector-automation</a:t>
             </a:r>
             <a:endParaRPr lang="en-US" sz="800" dirty="0">
               <a:solidFill>
@@ -3157,16 +3071,13 @@
                 <a:spcPct val="100000"/>
               </a:lnSpc>
               <a:buAutoNum type="arabicPeriod"/>
-            </a:pPr>
-            <a:r>
-              <a:rPr lang="en-US" sz="800" b="0" i="0" dirty="0">
-                <a:solidFill>
-                  <a:srgbClr val="000000"/>
-                </a:solidFill>
-                <a:effectLst/>
-                <a:latin typeface="+mj-lt"/>
+              <a:defRPr sz="800"/>
+            </a:pPr>
+            <a:r>
+              <a:rPr>
+                <a:hlinkClick r:id="rId21"/>
               </a:rPr>
-              <a:t>&lt;source&gt;</a:t>
+              <a:t>https://cio.economictimes.indiatimes.com/news/next-gen-technologies/max-healthcare-optimizes-automation-to-reimagine-healthcare-delivery/98288816</a:t>
             </a:r>
             <a:endParaRPr lang="en-US" sz="800" dirty="0">
               <a:solidFill>
@@ -3181,16 +3092,13 @@
                 <a:spcPct val="100000"/>
               </a:lnSpc>
               <a:buAutoNum type="arabicPeriod"/>
-            </a:pPr>
-            <a:r>
-              <a:rPr lang="en-US" sz="800" b="0" i="0" dirty="0">
-                <a:solidFill>
-                  <a:srgbClr val="000000"/>
-                </a:solidFill>
-                <a:effectLst/>
-                <a:latin typeface="+mj-lt"/>
+              <a:defRPr sz="800"/>
+            </a:pPr>
+            <a:r>
+              <a:rPr>
+                <a:hlinkClick r:id="rId22"/>
               </a:rPr>
-              <a:t>&lt;source&gt;</a:t>
+              <a:t>https://blog.hettshow.co.uk/rpa-saving-data-processing-time-by-up-to-75-percent</a:t>
             </a:r>
             <a:endParaRPr lang="en-US" sz="800" dirty="0">
               <a:solidFill>
@@ -4012,6 +3920,151 @@
       <p:grpSpPr/>
       <p:sp>
         <p:nvSpPr>
+          <p:cNvPr id="3" name="TextBox 2"/>
+          <p:cNvSpPr txBox="1"/>
+          <p:nvPr/>
+        </p:nvSpPr>
+        <p:spPr>
+          <a:xfrm>
+            <a:off x="0" y="0"/>
+            <a:ext cx="6858000" cy="1735156"/>
+          </a:xfrm>
+          <a:prstGeom prst="rect">
+            <a:avLst/>
+          </a:prstGeom>
+          <a:noFill/>
+        </p:spPr>
+        <p:txBody>
+          <a:bodyPr wrap="none">
+            <a:spAutoFit/>
+          </a:bodyPr>
+          <a:lstStyle/>
+          <a:p>
+            <a:pPr>
+              <a:defRPr sz="1000"/>
+            </a:pPr>
+            <a:r>
+              <a:t>Il est essentiel de comprendre les nombreux avantages⁴ que la RPA peut apporter à toute</a:t>
+            </a:r>
+            <a:br/>
+            <a:r>
+              <a:t>entreprise. En premier lieu, nous devons considérer les gains en efficacité opérationnelle. En</a:t>
+            </a:r>
+            <a:br/>
+            <a:r>
+              <a:t>confiant les tâches répétitives et laborieuses aux robots, les entreprises peuvent</a:t>
+            </a:r>
+            <a:br/>
+            <a:r>
+              <a:t>significativement réduire le temps passé à ces activités, permettant ainsi à leurs employés de se</a:t>
+            </a:r>
+            <a:br/>
+            <a:r>
+              <a:t>concentrer sur des tâches plus stratégiques et créatives. En plus de ces gains, la RPA permet</a:t>
+            </a:r>
+            <a:br/>
+            <a:r>
+              <a:t>d’accéder à des niveaux de précision et de fiabilité accessible uniquement à l’expérience</a:t>
+            </a:r>
+            <a:br/>
+            <a:r>
+              <a:t>machine. Cela induit une réduction notable des erreurs potentielles au niveau des tâches</a:t>
+            </a:r>
+            <a:br/>
+            <a:r>
+              <a:t>manuelles qui sont souvent sujettes à des erreurs humaines. Mais encore, la RPA détient un</a:t>
+            </a:r>
+            <a:br/>
+            <a:r>
+              <a:t>potentiel contributif majeur dans les processus de conformité⁵. Ce potentiel se révèle notamment</a:t>
+            </a:r>
+            <a:br/>
+            <a:r>
+              <a:t>grâce au fait que les robots suivent des règles et réglementations prédéfinies, assurant ainsi</a:t>
+            </a:r>
+            <a:br/>
+            <a:r>
+              <a:t>une conformité totale aux réglementations en vigueur.</a:t>
+            </a:r>
+          </a:p>
+        </p:txBody>
+      </p:sp>
+      <p:sp>
+        <p:nvSpPr>
+          <p:cNvPr id="4" name="TextBox 3"/>
+          <p:cNvSpPr txBox="1"/>
+          <p:nvPr/>
+        </p:nvSpPr>
+        <p:spPr>
+          <a:xfrm>
+            <a:off x="138545" y="1735156"/>
+            <a:ext cx="6858000" cy="274320"/>
+          </a:xfrm>
+          <a:prstGeom prst="rect">
+            <a:avLst/>
+          </a:prstGeom>
+          <a:noFill/>
+        </p:spPr>
+        <p:txBody>
+          <a:bodyPr wrap="none">
+            <a:spAutoFit/>
+          </a:bodyPr>
+          <a:lstStyle/>
+          <a:p>
+            <a:pPr>
+              <a:defRPr sz="1100" b="1">
+                <a:solidFill>
+                  <a:schemeClr val="accent6"/>
+                </a:solidFill>
+              </a:defRPr>
+            </a:pPr>
+            <a:r>
+              <a:t>État des lieux et niveau d’adoption de la technologie dans le monde</a:t>
+            </a:r>
+          </a:p>
+        </p:txBody>
+      </p:sp>
+      <p:sp>
+        <p:nvSpPr>
+          <p:cNvPr id="5" name="TextBox 4"/>
+          <p:cNvSpPr txBox="1"/>
+          <p:nvPr/>
+        </p:nvSpPr>
+        <p:spPr>
+          <a:xfrm>
+            <a:off x="0" y="2009476"/>
+            <a:ext cx="6858000" cy="565483"/>
+          </a:xfrm>
+          <a:prstGeom prst="rect">
+            <a:avLst/>
+          </a:prstGeom>
+          <a:noFill/>
+        </p:spPr>
+        <p:txBody>
+          <a:bodyPr wrap="none">
+            <a:spAutoFit/>
+          </a:bodyPr>
+          <a:lstStyle/>
+          <a:p>
+            <a:pPr>
+              <a:defRPr sz="1000"/>
+            </a:pPr>
+            <a:r>
+              <a:t>Le Centre d'Innovation Numérique (CIN) a initié une analyse détaillée sur la progression et le</a:t>
+            </a:r>
+            <a:br/>
+            <a:r>
+              <a:t>degré d'adoption des solutions fondées sur la RPA à travers certains pays membres de l'OCDE. Ce</a:t>
+            </a:r>
+            <a:br/>
+            <a:r>
+              <a:t>document synthétise les points clés découverts au cours de cette étude approfondie.</a:t>
+            </a:r>
+          </a:p>
+        </p:txBody>
+      </p:sp>
+      <p:sp>
+        <p:nvSpPr>
           <p:cNvPr id="2" name="Title 1"/>
           <p:cNvSpPr>
             <a:spLocks noGrp="1"/>
@@ -4022,7 +4075,7 @@
         </p:nvSpPr>
         <p:spPr>
           <a:xfrm>
-            <a:off x="138545" y="15000"/>
+            <a:off x="138545" y="2589959"/>
             <a:ext cx="6557819" cy="400000"/>
           </a:xfrm>
         </p:spPr>
@@ -4038,20 +4091,20 @@
               </a:defRPr>
             </a:pPr>
             <a:r>
-              <a:t>États-Unis</a:t>
-            </a:r>
-          </a:p>
-        </p:txBody>
-      </p:sp>
-      <p:sp>
-        <p:nvSpPr>
-          <p:cNvPr id="3" name="TextBox 2"/>
+              <a:t>Amérique du nord</a:t>
+            </a:r>
+          </a:p>
+        </p:txBody>
+      </p:sp>
+      <p:sp>
+        <p:nvSpPr>
+          <p:cNvPr id="6" name="TextBox 5"/>
           <p:cNvSpPr txBox="1"/>
           <p:nvPr/>
         </p:nvSpPr>
         <p:spPr>
           <a:xfrm>
-            <a:off x="138545" y="430000"/>
+            <a:off x="138545" y="3004959"/>
             <a:ext cx="6858000" cy="274320"/>
           </a:xfrm>
           <a:prstGeom prst="rect">
@@ -4073,21 +4126,21 @@
               </a:defRPr>
             </a:pPr>
             <a:r>
-              <a:t>Technologies Web</a:t>
-            </a:r>
-          </a:p>
-        </p:txBody>
-      </p:sp>
-      <p:sp>
-        <p:nvSpPr>
-          <p:cNvPr id="4" name="TextBox 3"/>
+              <a:t>Trouver une place pour la RPA dans le système bancaire et financier canadien</a:t>
+            </a:r>
+          </a:p>
+        </p:txBody>
+      </p:sp>
+      <p:sp>
+        <p:nvSpPr>
+          <p:cNvPr id="7" name="TextBox 6"/>
           <p:cNvSpPr txBox="1"/>
           <p:nvPr/>
         </p:nvSpPr>
         <p:spPr>
           <a:xfrm>
-            <a:off x="0" y="704320"/>
-            <a:ext cx="6858000" cy="1710056"/>
+            <a:off x="0" y="3279279"/>
+            <a:ext cx="6858000" cy="1833884"/>
           </a:xfrm>
           <a:prstGeom prst="rect">
             <a:avLst/>
@@ -4104,57 +4157,61 @@
               <a:defRPr sz="1000"/>
             </a:pPr>
             <a:r>
-              <a:t>Cloudflare est une entreprise américaine qui offre des services de sécurité pour les sites web³.</a:t>
-            </a:r>
-            <a:br/>
-            <a:r>
-              <a:t>Les entreprises voulant un site web fiable et non-vulnérable, mais ne voulant pas s’occuper de</a:t>
-            </a:r>
-            <a:br/>
-            <a:r>
-              <a:t>toute la maintenance, utilisent Cloudflare. Ce service se place entre les utilisateurs et le site</a:t>
-            </a:r>
-            <a:br/>
-            <a:r>
-              <a:t>web et peut répartir les requêtes, s’assurant de ne pas surcharger le site en question. Si un</a:t>
-            </a:r>
-            <a:br/>
-            <a:r>
-              <a:t>utilisateur est au Québec et que le site web est hébergé à Londres, l’utilisateur va en premier</a:t>
-            </a:r>
-            <a:br/>
-            <a:r>
-              <a:t>devoir passer par le serveur de Cloudflare avant d’accéder au site web. Cela offre une protection</a:t>
-            </a:r>
-            <a:br/>
-            <a:r>
-              <a:t>au site, mais ajoute aussi une étape intermédiaire qui augmente la distance que doit parcourir</a:t>
-            </a:r>
-            <a:br/>
-            <a:r>
-              <a:t>les données et peut faire doubler le temps de chargement. Pour remédier à cela, Cloudflare a un</a:t>
-            </a:r>
-            <a:br/>
-            <a:r>
-              <a:t>réseau de serveurs périphériques à plusieurs endroits dans le monde, ce qui veut dire qu’il y a</a:t>
-            </a:r>
-            <a:br/>
-            <a:r>
-              <a:t>toujours un serveur à proximité de l’utilisateur. De cette manière, la latence est minimisée.</a:t>
-            </a:r>
-          </a:p>
-        </p:txBody>
-      </p:sp>
-      <p:sp>
-        <p:nvSpPr>
-          <p:cNvPr id="5" name="TextBox 4"/>
+              <a:t>L'automatisation des processus robotiques (RPA) a la capacité d’impacter durablement le secteur</a:t>
+            </a:r>
+            <a:br/>
+            <a:r>
+              <a:t>bancaire et financier canadien. Cette emprunte est déjà visible notamment à travers l'exemple</a:t>
+            </a:r>
+            <a:br/>
+            <a:r>
+              <a:t>emblématique de la Royal Bank of Canada⁶ (RBC). Confrontée à des processus opérationnels</a:t>
+            </a:r>
+            <a:br/>
+            <a:r>
+              <a:t>complexes et répétitifs, la RBC a fait appel à la RPA pour optimiser ses performances et répondre</a:t>
+            </a:r>
+            <a:br/>
+            <a:r>
+              <a:t>efficacement aux attentes de ses clients. En automatisant des tâches telles que la vérification</a:t>
+            </a:r>
+            <a:br/>
+            <a:r>
+              <a:t>des données, l'établissement des relevés de compte ou la gestion des demandes clients, la RBC a</a:t>
+            </a:r>
+            <a:br/>
+            <a:r>
+              <a:t>pu non seulement réduire considérablement le temps de traitement, mais également minimiser le</a:t>
+            </a:r>
+            <a:br/>
+            <a:r>
+              <a:t>risque d'erreurs humaines et améliorer la précision des données. De plus, la RPA a permis à la</a:t>
+            </a:r>
+            <a:br/>
+            <a:r>
+              <a:t>banque de réaliser des économies significatives, tant en termes de main-d'œuvre que de coûts</a:t>
+            </a:r>
+            <a:br/>
+            <a:r>
+              <a:t>opérationnels. Cette transformation numérique, bien qu'encore en cours, positionne déjà la RBC</a:t>
+            </a:r>
+            <a:br/>
+            <a:r>
+              <a:t>comme une référence en matière d'adoption de la RPA dans le paysage bancaire canadien.</a:t>
+            </a:r>
+          </a:p>
+        </p:txBody>
+      </p:sp>
+      <p:sp>
+        <p:nvSpPr>
+          <p:cNvPr id="8" name="TextBox 7"/>
           <p:cNvSpPr txBox="1"/>
           <p:nvPr/>
         </p:nvSpPr>
         <p:spPr>
           <a:xfrm>
-            <a:off x="0" y="2414376"/>
-            <a:ext cx="6858000" cy="1378732"/>
+            <a:off x="138545" y="5113163"/>
+            <a:ext cx="6858000" cy="274320"/>
           </a:xfrm>
           <a:prstGeom prst="rect">
             <a:avLst/>
@@ -4168,56 +4225,28 @@
           <a:lstStyle/>
           <a:p>
             <a:pPr>
-              <a:defRPr sz="1000"/>
-            </a:pPr>
-            <a:r>
-              <a:t>L’informatique de périphérie est aussi utilisée par des solutions d’hébergement de sites web.</a:t>
-            </a:r>
-            <a:br/>
-            <a:r>
-              <a:t>Vercel est un hébergeur de sites web qui offre la possibilité de déployer son site sur plusieurs</a:t>
-            </a:r>
-            <a:br/>
-            <a:r>
-              <a:t>lieux géographiques en même temps. En effet, grâce à son “Edge Network”⁴, Vercel déploie les</a:t>
-            </a:r>
-            <a:br/>
-            <a:r>
-              <a:t>sites web de ses clients sur différents serveurs dans le monde. L’avantage est que si un</a:t>
-            </a:r>
-            <a:br/>
-            <a:r>
-              <a:t>utilisateur veut se connecter au site, il va se connecter au serveur le plus rapproché.</a:t>
-            </a:r>
-            <a:br/>
-            <a:r>
-              <a:t>Traditionnellement, un site web hébergé à un seul endroit ne pouvait pas offrir le même temps de</a:t>
-            </a:r>
-            <a:br/>
-            <a:r>
-              <a:t>chargement à tout le monde dépendamment de la position géographique des utilisateurs, mais avec</a:t>
-            </a:r>
-            <a:br/>
-            <a:r>
-              <a:t>l’informatique de périphérie, Vercel peut garantir un court temps de chargement peu importe</a:t>
-            </a:r>
-            <a:br/>
-            <a:r>
-              <a:t>l’emplacement.</a:t>
-            </a:r>
-          </a:p>
-        </p:txBody>
-      </p:sp>
-      <p:sp>
-        <p:nvSpPr>
-          <p:cNvPr id="6" name="TextBox 5"/>
+              <a:defRPr sz="1100" b="1">
+                <a:solidFill>
+                  <a:schemeClr val="accent6"/>
+                </a:solidFill>
+              </a:defRPr>
+            </a:pPr>
+            <a:r>
+              <a:t>La RPA au service de l'expérience client dans les télécommunications : l'exemple de telus</a:t>
+            </a:r>
+          </a:p>
+        </p:txBody>
+      </p:sp>
+      <p:sp>
+        <p:nvSpPr>
+          <p:cNvPr id="9" name="TextBox 8"/>
           <p:cNvSpPr txBox="1"/>
           <p:nvPr/>
         </p:nvSpPr>
         <p:spPr>
           <a:xfrm>
-            <a:off x="138545" y="3793108"/>
-            <a:ext cx="6858000" cy="274320"/>
+            <a:off x="0" y="5387483"/>
+            <a:ext cx="6858000" cy="1857310"/>
           </a:xfrm>
           <a:prstGeom prst="rect">
             <a:avLst/>
@@ -4231,28 +4260,68 @@
           <a:lstStyle/>
           <a:p>
             <a:pPr>
-              <a:defRPr sz="1100" b="1">
-                <a:solidFill>
-                  <a:schemeClr val="accent6"/>
-                </a:solidFill>
-              </a:defRPr>
-            </a:pPr>
-            <a:r>
-              <a:t>Industriel</a:t>
-            </a:r>
-          </a:p>
-        </p:txBody>
-      </p:sp>
-      <p:sp>
-        <p:nvSpPr>
-          <p:cNvPr id="7" name="TextBox 6"/>
+              <a:defRPr sz="1000"/>
+            </a:pPr>
+            <a:r>
+              <a:t>L'industrie canadienne des télécommunications, toujours à la recherche d'innovations pour</a:t>
+            </a:r>
+            <a:br/>
+            <a:r>
+              <a:t>améliorer l'expérience client, trouve dans la RPA un allié de poids. Telus⁷, l'un des plus grands</a:t>
+            </a:r>
+            <a:br/>
+            <a:r>
+              <a:t>opérateurs télécom du pays, offre un exemple concret de cette intégration. Grâce à la RPA, Telus</a:t>
+            </a:r>
+            <a:br/>
+            <a:r>
+              <a:t>a optimisé ses opérations internes, en automatisant des processus répétitifs et laborieux tels</a:t>
+            </a:r>
+            <a:br/>
+            <a:r>
+              <a:t>que la gestion des abonnements, l'administration des services ou encore le traitement des</a:t>
+            </a:r>
+            <a:br/>
+            <a:r>
+              <a:t>réclamations. En libérant ses employés de ces tâches chronophages, l'entreprise a pu recentrer</a:t>
+            </a:r>
+            <a:br/>
+            <a:r>
+              <a:t>ses efforts sur des activités à plus forte valeur ajoutée, améliorant ainsi la qualité du service</a:t>
+            </a:r>
+            <a:br/>
+            <a:r>
+              <a:t>client. De plus, la RPA a permis d'accélérer les réponses aux demandes des clients et d'assurer</a:t>
+            </a:r>
+            <a:br/>
+            <a:r>
+              <a:t>une plus grande précision dans le traitement des données, augmentant ainsi la satisfaction de la</a:t>
+            </a:r>
+            <a:br/>
+            <a:r>
+              <a:t>clientèle. Cette illustration démontre bien la capacité de la RPA d’amorcer un processus de</a:t>
+            </a:r>
+            <a:br/>
+            <a:r>
+              <a:t>transformation et d’automatisation de l’interaction client dans le secteur des</a:t>
+            </a:r>
+            <a:br/>
+            <a:r>
+              <a:t>télécommunications.</a:t>
+            </a:r>
+          </a:p>
+        </p:txBody>
+      </p:sp>
+      <p:sp>
+        <p:nvSpPr>
+          <p:cNvPr id="10" name="TextBox 9"/>
           <p:cNvSpPr txBox="1"/>
           <p:nvPr/>
         </p:nvSpPr>
         <p:spPr>
           <a:xfrm>
-            <a:off x="0" y="4067428"/>
-            <a:ext cx="6858000" cy="2217081"/>
+            <a:off x="138545" y="7244793"/>
+            <a:ext cx="6858000" cy="274320"/>
           </a:xfrm>
           <a:prstGeom prst="rect">
             <a:avLst/>
@@ -4266,222 +4335,14 @@
           <a:lstStyle/>
           <a:p>
             <a:pPr>
-              <a:defRPr sz="1000"/>
-            </a:pPr>
-            <a:r>
-              <a:t>Chevron, une compagnie dans l’industrie du pétrole, utilise l’informatique de périphérie pour</a:t>
-            </a:r>
-            <a:br/>
-            <a:r>
-              <a:t>plusieurs tâches. En effet, dû à ses opérations dans plusieurs endroits dans le monde, l’Internet</a:t>
-            </a:r>
-            <a:br/>
-            <a:r>
-              <a:t>n’est pas toujours facile d’accès. Par exemple, la compagnie possède des installations au large</a:t>
-            </a:r>
-            <a:br/>
-            <a:r>
-              <a:t>de la mer, les rendant très éloignées. Il est donc très approprié que les installations éloignées</a:t>
-            </a:r>
-            <a:br/>
-            <a:r>
-              <a:t>aient leurs propres serveurs sur place. Effectivement, leurs plateformes pétrolières collectent</a:t>
-            </a:r>
-            <a:br/>
-            <a:r>
-              <a:t>beaucoup de données provenant de capteurs qui surveillent la qualité de la machinerie⁵. Certains</a:t>
-            </a:r>
-            <a:br/>
-            <a:r>
-              <a:t>capteurs surveillent du matériel critique afin notamment d’assurer que la pression dans les</a:t>
-            </a:r>
-            <a:br/>
-            <a:r>
-              <a:t>tuyaux n’est pas trop élevée. Si ces capteurs détectent quelque chose d’anormal, il faut qu’ils</a:t>
-            </a:r>
-            <a:br/>
-            <a:r>
-              <a:t>agissent rapidement. Avoir des serveurs sur place leur permet de réduire la latence au maximum.</a:t>
-            </a:r>
-            <a:br/>
-            <a:r>
-              <a:t>En plus, ils sauvent beaucoup de bande passante, donc aussi de l’argent. Comme la compagnie opère</a:t>
-            </a:r>
-            <a:br/>
-            <a:r>
-              <a:t>dans différents pays, cela facilite aussi la conformité avec les lois sur la résidence des</a:t>
-            </a:r>
-            <a:br/>
-            <a:r>
-              <a:t>données de chaque pays⁶. Les données peuvent être traitées sur place de manière conforme aux lois</a:t>
-            </a:r>
-            <a:br/>
-            <a:r>
-              <a:t>du pays dans lequel les données sont collectées, avant d’être envoyées aux serveurs du siège</a:t>
-            </a:r>
-            <a:br/>
-            <a:r>
-              <a:t>social de Chevron.</a:t>
-            </a:r>
-          </a:p>
-        </p:txBody>
-      </p:sp>
-      <p:sp>
-        <p:nvSpPr>
-          <p:cNvPr id="2" name="Title 1"/>
-          <p:cNvSpPr>
-            <a:spLocks noGrp="1"/>
-          </p:cNvSpPr>
-          <p:nvPr>
-            <p:ph type="title"/>
-          </p:nvPr>
-        </p:nvSpPr>
-        <p:spPr>
-          <a:xfrm>
-            <a:off x="138545" y="6299509"/>
-            <a:ext cx="6557819" cy="400000"/>
-          </a:xfrm>
-        </p:spPr>
-        <p:txBody>
-          <a:bodyPr/>
-          <a:lstStyle/>
-          <a:p>
-            <a:pPr>
-              <a:defRPr b="1" i="1">
-                <a:solidFill>
-                  <a:schemeClr val="bg1"/>
+              <a:defRPr sz="1100" b="1">
+                <a:solidFill>
+                  <a:schemeClr val="accent6"/>
                 </a:solidFill>
               </a:defRPr>
             </a:pPr>
             <a:r>
-              <a:t>France</a:t>
-            </a:r>
-          </a:p>
-        </p:txBody>
-      </p:sp>
-      <p:sp>
-        <p:nvSpPr>
-          <p:cNvPr id="8" name="TextBox 7"/>
-          <p:cNvSpPr txBox="1"/>
-          <p:nvPr/>
-        </p:nvSpPr>
-        <p:spPr>
-          <a:xfrm>
-            <a:off x="0" y="6714509"/>
-            <a:ext cx="6858000" cy="1351958"/>
-          </a:xfrm>
-          <a:prstGeom prst="rect">
-            <a:avLst/>
-          </a:prstGeom>
-          <a:noFill/>
-        </p:spPr>
-        <p:txBody>
-          <a:bodyPr wrap="none">
-            <a:spAutoFit/>
-          </a:bodyPr>
-          <a:lstStyle/>
-          <a:p>
-            <a:pPr>
-              <a:defRPr sz="1000"/>
-            </a:pPr>
-            <a:r>
-              <a:t>Menta est une compagnie qui se spécialise dans les puces reprogrammables. C’est-à-dire des</a:t>
-            </a:r>
-            <a:br/>
-            <a:r>
-              <a:t>microprocesseurs avec une circuiterie modifiable même après la fabrication. La compagnie croit</a:t>
-            </a:r>
-            <a:br/>
-            <a:r>
-              <a:t>que l’informatique de périphérie nécessitera des machines avec microprocesseurs personnalisés⁷.</a:t>
-            </a:r>
-            <a:br/>
-            <a:r>
-              <a:t>En effet, les serveurs qui analysent les données à proximité de leur source, ont souvent une</a:t>
-            </a:r>
-            <a:br/>
-            <a:r>
-              <a:t>tâche très spécifique et traitent les données de manière différente en fonction de ce que veut la</a:t>
-            </a:r>
-            <a:br/>
-            <a:r>
-              <a:t>compagnie. Comme les microprocesseurs traditionnels tout usage ne sont pas nécessairement</a:t>
-            </a:r>
-            <a:br/>
-            <a:r>
-              <a:t>optimisés pour cette tâche, Menta offre la possibilité de programmer une puce pour qu’elle soit</a:t>
-            </a:r>
-            <a:br/>
-            <a:r>
-              <a:t>le plus adaptée pour la tâche qu’elle exécute et que le processus soit plus efficace.</a:t>
-            </a:r>
-          </a:p>
-        </p:txBody>
-      </p:sp>
-      <p:sp>
-        <p:nvSpPr>
-          <p:cNvPr id="2" name="Title 1"/>
-          <p:cNvSpPr>
-            <a:spLocks noGrp="1"/>
-          </p:cNvSpPr>
-          <p:nvPr>
-            <p:ph type="title"/>
-          </p:nvPr>
-        </p:nvSpPr>
-        <p:spPr>
-          <a:xfrm>
-            <a:off x="138545" y="8081467"/>
-            <a:ext cx="6557819" cy="400000"/>
-          </a:xfrm>
-        </p:spPr>
-        <p:txBody>
-          <a:bodyPr/>
-          <a:lstStyle/>
-          <a:p>
-            <a:pPr>
-              <a:defRPr b="1" i="1">
-                <a:solidFill>
-                  <a:schemeClr val="bg1"/>
-                </a:solidFill>
-              </a:defRPr>
-            </a:pPr>
-            <a:r>
-              <a:t>Royaume-Uni</a:t>
-            </a:r>
-          </a:p>
-        </p:txBody>
-      </p:sp>
-      <p:sp>
-        <p:nvSpPr>
-          <p:cNvPr id="9" name="TextBox 8"/>
-          <p:cNvSpPr txBox="1"/>
-          <p:nvPr/>
-        </p:nvSpPr>
-        <p:spPr>
-          <a:xfrm>
-            <a:off x="138545" y="8496467"/>
-            <a:ext cx="6858000" cy="274320"/>
-          </a:xfrm>
-          <a:prstGeom prst="rect">
-            <a:avLst/>
-          </a:prstGeom>
-          <a:noFill/>
-        </p:spPr>
-        <p:txBody>
-          <a:bodyPr wrap="none">
-            <a:spAutoFit/>
-          </a:bodyPr>
-          <a:lstStyle/>
-          <a:p>
-            <a:pPr>
-              <a:defRPr sz="1100" b="1">
-                <a:solidFill>
-                  <a:schemeClr val="accent6"/>
-                </a:solidFill>
-              </a:defRPr>
-            </a:pPr>
-            <a:r>
-              <a:t>Infonuagique</a:t>
+              <a:t>La RPA au secours des commerçants en ligne ?</a:t>
             </a:r>
           </a:p>
         </p:txBody>
@@ -4513,7 +4374,7 @@
         <p:spPr>
           <a:xfrm>
             <a:off x="0" y="0"/>
-            <a:ext cx="6858000" cy="767958"/>
+            <a:ext cx="6858000" cy="1827190"/>
           </a:xfrm>
           <a:prstGeom prst="rect">
             <a:avLst/>
@@ -4530,23 +4391,47 @@
               <a:defRPr sz="1000"/>
             </a:pPr>
             <a:r>
-              <a:t>Ori Industries est une compagnie qui se spécialise dans les services infonuagiques. La compagnie</a:t>
-            </a:r>
-            <a:br/>
-            <a:r>
-              <a:t>propose une solution pour déployer une application sur différent fournisseur infonuagique</a:t>
-            </a:r>
-            <a:br/>
-            <a:r>
-              <a:t>(Google, Amazon, Azure), en même temps⁸. Cela leur permet d’offrir un réseau périphérique encore</a:t>
-            </a:r>
-            <a:br/>
-            <a:r>
-              <a:t>plus vaste, car ils ne dépendent pas de la localisation des centres de données d’un fournisseur</a:t>
-            </a:r>
-            <a:br/>
-            <a:r>
-              <a:t>en particulier.</a:t>
+              <a:t>Il est important de tenir compte du fait que l'essor fulgurant du commerce en ligne a révélé le</a:t>
+            </a:r>
+            <a:br/>
+            <a:r>
+              <a:t>besoin crucial d'automatiser les processus de vente pour garantir une gestion optimale des</a:t>
+            </a:r>
+            <a:br/>
+            <a:r>
+              <a:t>transactions. C'est précisément ici que la RPA trouve une place de choix. En ce sens, il est</a:t>
+            </a:r>
+            <a:br/>
+            <a:r>
+              <a:t>possible pour les revendeurs inscrits sur la plateforme canadienne de commerce en ligne Shopify</a:t>
+            </a:r>
+            <a:br/>
+            <a:r>
+              <a:t>de procéder à l'intégration de l'application « Autopilot Your Shop with RPA »⁸. Cette application</a:t>
+            </a:r>
+            <a:br/>
+            <a:r>
+              <a:t>se sert de robots logiciels pour automatiser les tâches récurrentes liées à la vente en ligne.</a:t>
+            </a:r>
+            <a:br/>
+            <a:r>
+              <a:t>Que ce soit la gestion des stocks, le suivi des commandes, l'envoi des factures, ou encore</a:t>
+            </a:r>
+            <a:br/>
+            <a:r>
+              <a:t>l'interaction avec les clients, tout peut être pris en charge par ces robots. Le recours à la RPA</a:t>
+            </a:r>
+            <a:br/>
+            <a:r>
+              <a:t>permet ainsi aux marchands de se libérer d'un fardeau opérationnel considérable, leur permettant</a:t>
+            </a:r>
+            <a:br/>
+            <a:r>
+              <a:t>de se concentrer sur des tâches plus stratégiques. En outre, l'efficacité de ces robots garantit</a:t>
+            </a:r>
+            <a:br/>
+            <a:r>
+              <a:t>un service rapide, ce qui contribue à l'amélioration de l'expérience client.</a:t>
             </a:r>
           </a:p>
         </p:txBody>
@@ -4559,8 +4444,8 @@
         </p:nvSpPr>
         <p:spPr>
           <a:xfrm>
-            <a:off x="138545" y="767958"/>
-            <a:ext cx="6858000" cy="274320"/>
+            <a:off x="138545" y="1827190"/>
+            <a:ext cx="6858000" cy="282686"/>
           </a:xfrm>
           <a:prstGeom prst="rect">
             <a:avLst/>
@@ -4581,7 +4466,11 @@
               </a:defRPr>
             </a:pPr>
             <a:r>
-              <a:t>Internet des objets</a:t>
+              <a:t>La solution pour une meilleure gestion des dossiers patients et une réduction de l’inertie</a:t>
+            </a:r>
+            <a:br/>
+            <a:r>
+              <a:t>administrative</a:t>
             </a:r>
           </a:p>
         </p:txBody>
@@ -4594,8 +4483,8 @@
         </p:nvSpPr>
         <p:spPr>
           <a:xfrm>
-            <a:off x="0" y="1042278"/>
-            <a:ext cx="6858000" cy="1373712"/>
+            <a:off x="0" y="2109876"/>
+            <a:ext cx="6858000" cy="1994525"/>
           </a:xfrm>
           <a:prstGeom prst="rect">
             <a:avLst/>
@@ -4612,39 +4501,309 @@
               <a:defRPr sz="1000"/>
             </a:pPr>
             <a:r>
-              <a:t>Une autre compagnie britannique se spécialisant dans l’informatique de périphérie est Zededa.</a:t>
-            </a:r>
-            <a:br/>
-            <a:r>
-              <a:t>C'est une plateforme SaaS pour gérer un réseau de machines périphériques à grande échelle⁹. Par</a:t>
-            </a:r>
-            <a:br/>
-            <a:r>
-              <a:t>exemple, une compagnie qui possède plusieurs infrastructures et qui a un serveur dans chacune de</a:t>
-            </a:r>
-            <a:br/>
-            <a:r>
-              <a:t>celles-ci, peut facilement surveiller ses serveurs à partir de l’interface de Zededa. Le logiciel</a:t>
-            </a:r>
-            <a:br/>
-            <a:r>
-              <a:t>permet de facilement détecter s’il y a des problèmes avec une des infrastructures, de s’assurer</a:t>
-            </a:r>
-            <a:br/>
-            <a:r>
-              <a:t>que tous les points d’accès sont sécurisés, et même de pouvoir mettre à jour les logiciels</a:t>
-            </a:r>
-            <a:br/>
-            <a:r>
-              <a:t>exécutés sur les machines périphériques. Zededa évite ainsi de devoir aller physiquement</a:t>
-            </a:r>
-            <a:br/>
-            <a:r>
-              <a:t>maintenir les serveurs, qui peuvent parfois être localisés dans des endroits difficiles d’accès.</a:t>
-            </a:r>
-          </a:p>
-        </p:txBody>
-      </p:sp>
+              <a:t>Aux États-Unis, l'industrie de la santé a commencé à adopter la RPA pour automatiser en</a:t>
+            </a:r>
+            <a:br/>
+            <a:r>
+              <a:t>profondeur la gestion des dossiers patients. Cela comprend le traitement des admissions et des</a:t>
+            </a:r>
+            <a:br/>
+            <a:r>
+              <a:t>congés, la coordination des rendez-vous, et la facturation. Un cas concret serait celui du</a:t>
+            </a:r>
+            <a:br/>
+            <a:r>
+              <a:t>prestigieux hôpital Cleveland Clinic⁹ qui a mis en place une plateforme de RPA pour automatiser</a:t>
+            </a:r>
+            <a:br/>
+            <a:r>
+              <a:t>certains processus administratifs, conduisant à une réduction significative des erreurs humaines</a:t>
+            </a:r>
+            <a:br/>
+            <a:r>
+              <a:t>et à une amélioration de l'efficacité. Avant la pandémie de la COVID-19, la clinique avait déjà</a:t>
+            </a:r>
+            <a:br/>
+            <a:r>
+              <a:t>mis en place la RPA pour la vérification des assurances et l'audit des réclamations. Cependant,</a:t>
+            </a:r>
+            <a:br/>
+            <a:r>
+              <a:t>l'impact significatif de la RPA est devenu particulièrement apparent lors de l'apparition de la</a:t>
+            </a:r>
+            <a:br/>
+            <a:r>
+              <a:t>COVID-19. L'équipe de la Cleveland Clinic a alors décidé d'implémenter des robots assistés pour</a:t>
+            </a:r>
+            <a:br/>
+            <a:r>
+              <a:t>automatiser le processus d'inscription et d'impression une fois que l'identité du patient a été</a:t>
+            </a:r>
+            <a:br/>
+            <a:r>
+              <a:t>vérifiée par un humain. Ce système a permis de réduire le temps d'exécution de ces tâches de</a:t>
+            </a:r>
+            <a:br/>
+            <a:r>
+              <a:t>plusieurs minutes à une quinzaine de secondes, tout en évitant les erreurs d'impression.</a:t>
+            </a:r>
+          </a:p>
+        </p:txBody>
+      </p:sp>
+      <p:sp>
+        <p:nvSpPr>
+          <p:cNvPr id="6" name="TextBox 5"/>
+          <p:cNvSpPr txBox="1"/>
+          <p:nvPr/>
+        </p:nvSpPr>
+        <p:spPr>
+          <a:xfrm>
+            <a:off x="138545" y="4104401"/>
+            <a:ext cx="6858000" cy="274320"/>
+          </a:xfrm>
+          <a:prstGeom prst="rect">
+            <a:avLst/>
+          </a:prstGeom>
+          <a:noFill/>
+        </p:spPr>
+        <p:txBody>
+          <a:bodyPr wrap="none">
+            <a:spAutoFit/>
+          </a:bodyPr>
+          <a:lstStyle/>
+          <a:p>
+            <a:pPr>
+              <a:defRPr sz="1100" b="1">
+                <a:solidFill>
+                  <a:schemeClr val="accent6"/>
+                </a:solidFill>
+              </a:defRPr>
+            </a:pPr>
+            <a:r>
+              <a:t>Optimiser la gestion des ressources humaines, vers la fin des requêtes sans réponse ?</a:t>
+            </a:r>
+          </a:p>
+        </p:txBody>
+      </p:sp>
+      <p:sp>
+        <p:nvSpPr>
+          <p:cNvPr id="7" name="TextBox 6"/>
+          <p:cNvSpPr txBox="1"/>
+          <p:nvPr/>
+        </p:nvSpPr>
+        <p:spPr>
+          <a:xfrm>
+            <a:off x="0" y="4378721"/>
+            <a:ext cx="6858000" cy="2381070"/>
+          </a:xfrm>
+          <a:prstGeom prst="rect">
+            <a:avLst/>
+          </a:prstGeom>
+          <a:noFill/>
+        </p:spPr>
+        <p:txBody>
+          <a:bodyPr wrap="none">
+            <a:spAutoFit/>
+          </a:bodyPr>
+          <a:lstStyle/>
+          <a:p>
+            <a:pPr>
+              <a:defRPr sz="1000"/>
+            </a:pPr>
+            <a:r>
+              <a:t>En mettant en place une solution RPA, le géant américain IBM a su automatiser divers aspects du</a:t>
+            </a:r>
+            <a:br/>
+            <a:r>
+              <a:t>processus de recrutement, dont la recherche et la présélection des candidats, ainsi que la</a:t>
+            </a:r>
+            <a:br/>
+            <a:r>
+              <a:t>planification des entretiens. Avec l'aide de la RPA, IBM ¹⁰a pu réduire le temps consacré à ces</a:t>
+            </a:r>
+            <a:br/>
+            <a:r>
+              <a:t>tâches, permettant aux professionnels des ressources humaines de se concentrer sur des aspects</a:t>
+            </a:r>
+            <a:br/>
+            <a:r>
+              <a:t>plus nuancés du recrutement tels que l'évaluation de la culture d'entreprise et l'engagement des</a:t>
+            </a:r>
+            <a:br/>
+            <a:r>
+              <a:t>candidats. De plus, l'automatisation a permis d'éliminer les erreurs humaines inhérentes au</a:t>
+            </a:r>
+            <a:br/>
+            <a:r>
+              <a:t>processus de recrutement, ce qui a amélioré l'efficacité globale et l'expérience des candidats.</a:t>
+            </a:r>
+            <a:br/>
+            <a:r>
+              <a:t>En outre, IBM a utilisé la RPA pour améliorer l'interaction avec les candidats. Cela se</a:t>
+            </a:r>
+            <a:br/>
+            <a:r>
+              <a:t>matérialise notamment par le fait que les candidats peuvent maintenant recevoir des mises à jour</a:t>
+            </a:r>
+            <a:br/>
+            <a:r>
+              <a:t>automatiques sur le statut de leur candidature, ce qui améliore la communication et la</a:t>
+            </a:r>
+            <a:br/>
+            <a:r>
+              <a:t>transparence. De même, la RPA a également permis d'améliorer le processus d'intégration en</a:t>
+            </a:r>
+            <a:br/>
+            <a:r>
+              <a:t>automatisant les tâches administratives associées à l'embauche de nouveaux employés. De fait, en</a:t>
+            </a:r>
+            <a:br/>
+            <a:r>
+              <a:t>tirant parti de l'automatisation, IBM a pu transformer son processus de recrutement en une</a:t>
+            </a:r>
+            <a:br/>
+            <a:r>
+              <a:t>machine bien huilée, capable de gérer efficacement un grand nombre de candidatures tout en</a:t>
+            </a:r>
+            <a:br/>
+            <a:r>
+              <a:t>maintenant une expérience positive pour les candidats.</a:t>
+            </a:r>
+          </a:p>
+        </p:txBody>
+      </p:sp>
+      <p:sp>
+        <p:nvSpPr>
+          <p:cNvPr id="8" name="TextBox 7"/>
+          <p:cNvSpPr txBox="1"/>
+          <p:nvPr/>
+        </p:nvSpPr>
+        <p:spPr>
+          <a:xfrm>
+            <a:off x="138545" y="6759791"/>
+            <a:ext cx="6858000" cy="274320"/>
+          </a:xfrm>
+          <a:prstGeom prst="rect">
+            <a:avLst/>
+          </a:prstGeom>
+          <a:noFill/>
+        </p:spPr>
+        <p:txBody>
+          <a:bodyPr wrap="none">
+            <a:spAutoFit/>
+          </a:bodyPr>
+          <a:lstStyle/>
+          <a:p>
+            <a:pPr>
+              <a:defRPr sz="1100" b="1">
+                <a:solidFill>
+                  <a:schemeClr val="accent6"/>
+                </a:solidFill>
+              </a:defRPr>
+            </a:pPr>
+            <a:r>
+              <a:t>Commerce et logistique</a:t>
+            </a:r>
+          </a:p>
+        </p:txBody>
+      </p:sp>
+      <p:sp>
+        <p:nvSpPr>
+          <p:cNvPr id="9" name="TextBox 8"/>
+          <p:cNvSpPr txBox="1"/>
+          <p:nvPr/>
+        </p:nvSpPr>
+        <p:spPr>
+          <a:xfrm>
+            <a:off x="0" y="7034111"/>
+            <a:ext cx="6858000" cy="2063133"/>
+          </a:xfrm>
+          <a:prstGeom prst="rect">
+            <a:avLst/>
+          </a:prstGeom>
+          <a:noFill/>
+        </p:spPr>
+        <p:txBody>
+          <a:bodyPr wrap="none">
+            <a:spAutoFit/>
+          </a:bodyPr>
+          <a:lstStyle/>
+          <a:p>
+            <a:pPr>
+              <a:defRPr sz="1000"/>
+            </a:pPr>
+            <a:r>
+              <a:t>La gestion de stock peut s’avérer être un véritable casse-tête surtout dès lors que l’on atteint</a:t>
+            </a:r>
+            <a:br/>
+            <a:r>
+              <a:t>des échelles de marché telles que celles couvertes par Wallmart¹¹, la célèbre chaine de commerce</a:t>
+            </a:r>
+            <a:br/>
+            <a:r>
+              <a:t>américaine. Face à ce défi logistique et en recourant à la RPA pour automatiser le suivi des</a:t>
+            </a:r>
+            <a:br/>
+            <a:r>
+              <a:t>stocks, Walmart a su améliorer l'exactitude de la gestion des stocks, évitant ainsi des</a:t>
+            </a:r>
+            <a:br/>
+            <a:r>
+              <a:t>situations problématiques comme les surstocks ou les ruptures de stock. La RPA permet</a:t>
+            </a:r>
+            <a:br/>
+            <a:r>
+              <a:t>d'automatiser un ensemble de tâches critiques pour le suivi des stocks, allant du</a:t>
+            </a:r>
+            <a:br/>
+            <a:r>
+              <a:t>réapprovisionnement automatique des articles au suivi des tendances de vente pour prévoir les</a:t>
+            </a:r>
+            <a:br/>
+            <a:r>
+              <a:t>besoins futurs en stock en passant par le signalement rapide des anomalies. En résulte une</a:t>
+            </a:r>
+            <a:br/>
+            <a:r>
+              <a:t>gestion plus précise et efficace de l'inventaire qui a un impact direct sur la satisfaction du</a:t>
+            </a:r>
+            <a:br/>
+            <a:r>
+              <a:t>client. Par ailleurs, l'introduction de la RPA a permis à Walmart de réduire les coûts associés</a:t>
+            </a:r>
+            <a:br/>
+            <a:r>
+              <a:t>au surstockage et aux ruptures de stock, améliorant ainsi sa rentabilité. Cette amélioration est</a:t>
+            </a:r>
+            <a:br/>
+            <a:r>
+              <a:t>due au fait que la RPA permet une meilleure synchronisation entre la demande des clients et le</a:t>
+            </a:r>
+            <a:br/>
+            <a:r>
+              <a:t>stock disponible, optimisant ainsi les coûts d'inventaire.</a:t>
+            </a:r>
+          </a:p>
+        </p:txBody>
+      </p:sp>
+    </p:spTree>
+  </p:cSld>
+  <p:clrMapOvr>
+    <a:masterClrMapping/>
+  </p:clrMapOvr>
+</p:sld>
+</file>
+
+<file path=ppt/slides/slide5.xml><?xml version="1.0" encoding="utf-8"?>
+<p:sld xmlns:a="http://schemas.openxmlformats.org/drawingml/2006/main" xmlns:p="http://schemas.openxmlformats.org/presentationml/2006/main" xmlns:r="http://schemas.openxmlformats.org/officeDocument/2006/relationships">
+  <p:cSld>
+    <p:spTree>
+      <p:nvGrpSpPr>
+        <p:cNvPr id="1" name=""/>
+        <p:cNvGrpSpPr/>
+        <p:nvPr/>
+      </p:nvGrpSpPr>
+      <p:grpSpPr/>
       <p:sp>
         <p:nvSpPr>
           <p:cNvPr id="2" name="Title 1"/>
@@ -4657,7 +4816,7 @@
         </p:nvSpPr>
         <p:spPr>
           <a:xfrm>
-            <a:off x="138545" y="2430990"/>
+            <a:off x="138545" y="15000"/>
             <a:ext cx="6557819" cy="400000"/>
           </a:xfrm>
         </p:spPr>
@@ -4673,21 +4832,21 @@
               </a:defRPr>
             </a:pPr>
             <a:r>
-              <a:t>Singapour</a:t>
-            </a:r>
-          </a:p>
-        </p:txBody>
-      </p:sp>
-      <p:sp>
-        <p:nvSpPr>
-          <p:cNvPr id="6" name="TextBox 5"/>
+              <a:t>Europe</a:t>
+            </a:r>
+          </a:p>
+        </p:txBody>
+      </p:sp>
+      <p:sp>
+        <p:nvSpPr>
+          <p:cNvPr id="3" name="TextBox 2"/>
           <p:cNvSpPr txBox="1"/>
           <p:nvPr/>
         </p:nvSpPr>
         <p:spPr>
           <a:xfrm>
-            <a:off x="0" y="2845990"/>
-            <a:ext cx="6858000" cy="1628061"/>
+            <a:off x="138545" y="430000"/>
+            <a:ext cx="6858000" cy="274320"/>
           </a:xfrm>
           <a:prstGeom prst="rect">
             <a:avLst/>
@@ -4701,46 +4860,718 @@
           <a:lstStyle/>
           <a:p>
             <a:pPr>
+              <a:defRPr sz="1100" b="1">
+                <a:solidFill>
+                  <a:schemeClr val="accent6"/>
+                </a:solidFill>
+              </a:defRPr>
+            </a:pPr>
+            <a:r>
+              <a:t>La santé publique un domaine propice à l’expansion de la RPA</a:t>
+            </a:r>
+          </a:p>
+        </p:txBody>
+      </p:sp>
+      <p:sp>
+        <p:nvSpPr>
+          <p:cNvPr id="4" name="TextBox 3"/>
+          <p:cNvSpPr txBox="1"/>
+          <p:nvPr/>
+        </p:nvSpPr>
+        <p:spPr>
+          <a:xfrm>
+            <a:off x="0" y="704320"/>
+            <a:ext cx="6858000" cy="1691649"/>
+          </a:xfrm>
+          <a:prstGeom prst="rect">
+            <a:avLst/>
+          </a:prstGeom>
+          <a:noFill/>
+        </p:spPr>
+        <p:txBody>
+          <a:bodyPr wrap="none">
+            <a:spAutoFit/>
+          </a:bodyPr>
+          <a:lstStyle/>
+          <a:p>
+            <a:pPr>
               <a:defRPr sz="1000"/>
             </a:pPr>
             <a:r>
-              <a:t>ST Engineering, une compagnie de Singapour offrant des services dans le domaine de la sécurité</a:t>
-            </a:r>
-            <a:br/>
-            <a:r>
-              <a:t>pour les agences et les gouvernements, notamment des modèles d’intelligence artificielle pour de</a:t>
-            </a:r>
-            <a:br/>
-            <a:r>
-              <a:t>la reconnaissance faciale, de la détection de comportements anormales, et plus encore¹⁰. Leur</a:t>
-            </a:r>
-            <a:br/>
-            <a:r>
-              <a:t>service inclut la possibilité d’intégrer l’informatique de périphérie et de faire tourner leur</a:t>
-            </a:r>
-            <a:br/>
-            <a:r>
-              <a:t>logiciel d’intelligence artificielle sur des systèmes embarquées (appareil électronique</a:t>
-            </a:r>
-            <a:br/>
-            <a:r>
-              <a:t>spécialisé pour effectuer une tâche)¹¹. Cela permet par exemple de récupérer le flux d’une caméra</a:t>
-            </a:r>
-            <a:br/>
-            <a:r>
-              <a:t>de surveillance et de l’envoyé sur un ordinateur, et c’est ce même ordinateur qui exécutera le</a:t>
-            </a:r>
-            <a:br/>
-            <a:r>
-              <a:t>modèle d’IA de reconnaissance faciale. Les données de la caméra n’ont donc même pas besoin de</a:t>
-            </a:r>
-            <a:br/>
-            <a:r>
-              <a:t>passer par Internet, elles sont directement traitées sur place. Ce système a l’avantage de</a:t>
-            </a:r>
-            <a:br/>
-            <a:r>
-              <a:t>fonctionner sans connexion à un réseau, et n’a aucune latence.</a:t>
+              <a:t>L'AP-HP (Assistance Publique - Hôpitaux de Paris)¹², en tant que réseau hospitalier de premier</a:t>
+            </a:r>
+            <a:br/>
+            <a:r>
+              <a:t>plan en France, s'est engagée à exploiter les avantages de la RPA, particulièrement dans la</a:t>
+            </a:r>
+            <a:br/>
+            <a:r>
+              <a:t>gestion des dossiers patients. Les robots peuvent non seulement numériser et classer des</a:t>
+            </a:r>
+            <a:br/>
+            <a:r>
+              <a:t>documents, mais aussi vérifier l'exactitude des informations, une tâche qui serait fastidieuse et</a:t>
+            </a:r>
+            <a:br/>
+            <a:r>
+              <a:t>sujette à erreurs si elle était effectuée manuellement. Cela permet une consolidation efficace</a:t>
+            </a:r>
+            <a:br/>
+            <a:r>
+              <a:t>des données, facilitant leur accès pour les professionnels de la santé et améliorant l'exactitude</a:t>
+            </a:r>
+            <a:br/>
+            <a:r>
+              <a:t>du diagnostic et du traitement. De plus, la possibilité de rechercher rapidement les dossiers des</a:t>
+            </a:r>
+            <a:br/>
+            <a:r>
+              <a:t>patients réduit le temps d'attente pour les patients et augmente leur satisfaction. À long terme,</a:t>
+            </a:r>
+            <a:br/>
+            <a:r>
+              <a:t>l'AP-HP envisage une application plus large de la RPA, y compris la surveillance des médicaments,</a:t>
+            </a:r>
+            <a:br/>
+            <a:r>
+              <a:t>l'aide à la planification des rendez-vous, et même le soutien à la recherche clinique.</a:t>
+            </a:r>
+          </a:p>
+        </p:txBody>
+      </p:sp>
+      <p:sp>
+        <p:nvSpPr>
+          <p:cNvPr id="5" name="TextBox 4"/>
+          <p:cNvSpPr txBox="1"/>
+          <p:nvPr/>
+        </p:nvSpPr>
+        <p:spPr>
+          <a:xfrm>
+            <a:off x="138545" y="2395969"/>
+            <a:ext cx="6858000" cy="274320"/>
+          </a:xfrm>
+          <a:prstGeom prst="rect">
+            <a:avLst/>
+          </a:prstGeom>
+          <a:noFill/>
+        </p:spPr>
+        <p:txBody>
+          <a:bodyPr wrap="none">
+            <a:spAutoFit/>
+          </a:bodyPr>
+          <a:lstStyle/>
+          <a:p>
+            <a:pPr>
+              <a:defRPr sz="1100" b="1">
+                <a:solidFill>
+                  <a:schemeClr val="accent6"/>
+                </a:solidFill>
+              </a:defRPr>
+            </a:pPr>
+            <a:r>
+              <a:t>Vers une automatisation de la gestion des réclamations en assurance</a:t>
+            </a:r>
+          </a:p>
+        </p:txBody>
+      </p:sp>
+      <p:sp>
+        <p:nvSpPr>
+          <p:cNvPr id="6" name="TextBox 5"/>
+          <p:cNvSpPr txBox="1"/>
+          <p:nvPr/>
+        </p:nvSpPr>
+        <p:spPr>
+          <a:xfrm>
+            <a:off x="0" y="2670289"/>
+            <a:ext cx="6858000" cy="1681609"/>
+          </a:xfrm>
+          <a:prstGeom prst="rect">
+            <a:avLst/>
+          </a:prstGeom>
+          <a:noFill/>
+        </p:spPr>
+        <p:txBody>
+          <a:bodyPr wrap="none">
+            <a:spAutoFit/>
+          </a:bodyPr>
+          <a:lstStyle/>
+          <a:p>
+            <a:pPr>
+              <a:defRPr sz="1000"/>
+            </a:pPr>
+            <a:r>
+              <a:t>L'assureur français AXA¹³ a intégré une utilisation pertinente de la RPA dans le processus de</a:t>
+            </a:r>
+            <a:br/>
+            <a:r>
+              <a:t>gestion des réclamations. Non seulement les outils d’automatisation ici peuvent optimiser le</a:t>
+            </a:r>
+            <a:br/>
+            <a:r>
+              <a:t>processus d'évaluation des réclamations, mais ils peuvent également détecter les réclamations</a:t>
+            </a:r>
+            <a:br/>
+            <a:r>
+              <a:t>frauduleuses en analysant les schémas de données, une tâche qui serait difficile à accomplir pour</a:t>
+            </a:r>
+            <a:br/>
+            <a:r>
+              <a:t>un humain. Par ailleurs, l'efficacité accrue de la RPA a également un impact positif sur le</a:t>
+            </a:r>
+            <a:br/>
+            <a:r>
+              <a:t>service à la clientèle : avec des délais de traitement plus courts, les clients peuvent recevoir</a:t>
+            </a:r>
+            <a:br/>
+            <a:r>
+              <a:t>leurs paiements plus rapidement, ce qui améliore leur satisfaction et renforce leur confiance</a:t>
+            </a:r>
+            <a:br/>
+            <a:r>
+              <a:t>envers l'assureur. AXA envisage également l'utilisation de la RPA pour automatiser d'autres</a:t>
+            </a:r>
+            <a:br/>
+            <a:r>
+              <a:t>processus internes, tels que la gestion des polices d'assurance et la préparation des rapports</a:t>
+            </a:r>
+            <a:br/>
+            <a:r>
+              <a:t>financiers, ouvrant ainsi la voie à une transformation numérique plus large de l'entreprise.</a:t>
+            </a:r>
+          </a:p>
+        </p:txBody>
+      </p:sp>
+      <p:sp>
+        <p:nvSpPr>
+          <p:cNvPr id="7" name="TextBox 6"/>
+          <p:cNvSpPr txBox="1"/>
+          <p:nvPr/>
+        </p:nvSpPr>
+        <p:spPr>
+          <a:xfrm>
+            <a:off x="138545" y="4351898"/>
+            <a:ext cx="6858000" cy="274320"/>
+          </a:xfrm>
+          <a:prstGeom prst="rect">
+            <a:avLst/>
+          </a:prstGeom>
+          <a:noFill/>
+        </p:spPr>
+        <p:txBody>
+          <a:bodyPr wrap="none">
+            <a:spAutoFit/>
+          </a:bodyPr>
+          <a:lstStyle/>
+          <a:p>
+            <a:pPr>
+              <a:defRPr sz="1100" b="1">
+                <a:solidFill>
+                  <a:schemeClr val="accent6"/>
+                </a:solidFill>
+              </a:defRPr>
+            </a:pPr>
+            <a:r>
+              <a:t>Pour une plus large couverture des services public : Automatisation des services aux citoyens</a:t>
+            </a:r>
+          </a:p>
+        </p:txBody>
+      </p:sp>
+      <p:sp>
+        <p:nvSpPr>
+          <p:cNvPr id="8" name="TextBox 7"/>
+          <p:cNvSpPr txBox="1"/>
+          <p:nvPr/>
+        </p:nvSpPr>
+        <p:spPr>
+          <a:xfrm>
+            <a:off x="0" y="4626218"/>
+            <a:ext cx="6858000" cy="1525987"/>
+          </a:xfrm>
+          <a:prstGeom prst="rect">
+            <a:avLst/>
+          </a:prstGeom>
+          <a:noFill/>
+        </p:spPr>
+        <p:txBody>
+          <a:bodyPr wrap="none">
+            <a:spAutoFit/>
+          </a:bodyPr>
+          <a:lstStyle/>
+          <a:p>
+            <a:pPr>
+              <a:defRPr sz="1000"/>
+            </a:pPr>
+            <a:r>
+              <a:t>La Direction Générale des Finances Publiques française¹⁴ (DGFiP) illustre comment le secteur</a:t>
+            </a:r>
+            <a:br/>
+            <a:r>
+              <a:t>public en France peut bénéficier de l'utilisation de la RPA. En automatisant la collecte et le</a:t>
+            </a:r>
+            <a:br/>
+            <a:r>
+              <a:t>traitement des informations fiscales, la DGFiP a non seulement réduit le risque d'erreurs, mais a</a:t>
+            </a:r>
+            <a:br/>
+            <a:r>
+              <a:t>également accéléré les processus décisionnels. Cela se traduit par une amélioration du service</a:t>
+            </a:r>
+            <a:br/>
+            <a:r>
+              <a:t>pour les citoyens, car ils peuvent obtenir des réponses plus rapidement et plus précisément. En</a:t>
+            </a:r>
+            <a:br/>
+            <a:r>
+              <a:t>outre, la RPA pourrait également être utilisée pour améliorer l'efficacité de l'audit interne et</a:t>
+            </a:r>
+            <a:br/>
+            <a:r>
+              <a:t>du contrôle fiscal, contribuant ainsi à une meilleure gestion des finances publiques. A l'avenir,</a:t>
+            </a:r>
+            <a:br/>
+            <a:r>
+              <a:t>la DGFiP envisage d'étendre l'utilisation de la RPA à d'autres domaines, tels que le contrôle de</a:t>
+            </a:r>
+            <a:br/>
+            <a:r>
+              <a:t>l'exactitude des déclarations de revenus ou la prévention de la fraude fiscale.</a:t>
+            </a:r>
+          </a:p>
+        </p:txBody>
+      </p:sp>
+      <p:sp>
+        <p:nvSpPr>
+          <p:cNvPr id="9" name="TextBox 8"/>
+          <p:cNvSpPr txBox="1"/>
+          <p:nvPr/>
+        </p:nvSpPr>
+        <p:spPr>
+          <a:xfrm>
+            <a:off x="138545" y="6152205"/>
+            <a:ext cx="6858000" cy="274320"/>
+          </a:xfrm>
+          <a:prstGeom prst="rect">
+            <a:avLst/>
+          </a:prstGeom>
+          <a:noFill/>
+        </p:spPr>
+        <p:txBody>
+          <a:bodyPr wrap="none">
+            <a:spAutoFit/>
+          </a:bodyPr>
+          <a:lstStyle/>
+          <a:p>
+            <a:pPr>
+              <a:defRPr sz="1100" b="1">
+                <a:solidFill>
+                  <a:schemeClr val="accent6"/>
+                </a:solidFill>
+              </a:defRPr>
+            </a:pPr>
+            <a:r>
+              <a:t>Des entreprises britanniques spécialisées dans la mise à disposition de solutions de RPA</a:t>
+            </a:r>
+          </a:p>
+        </p:txBody>
+      </p:sp>
+    </p:spTree>
+  </p:cSld>
+  <p:clrMapOvr>
+    <a:masterClrMapping/>
+  </p:clrMapOvr>
+</p:sld>
+</file>
+
+<file path=ppt/slides/slide6.xml><?xml version="1.0" encoding="utf-8"?>
+<p:sld xmlns:a="http://schemas.openxmlformats.org/drawingml/2006/main" xmlns:p="http://schemas.openxmlformats.org/presentationml/2006/main" xmlns:r="http://schemas.openxmlformats.org/officeDocument/2006/relationships">
+  <p:cSld>
+    <p:spTree>
+      <p:nvGrpSpPr>
+        <p:cNvPr id="1" name=""/>
+        <p:cNvGrpSpPr/>
+        <p:nvPr/>
+      </p:nvGrpSpPr>
+      <p:grpSpPr/>
+      <p:sp>
+        <p:nvSpPr>
+          <p:cNvPr id="3" name="TextBox 2"/>
+          <p:cNvSpPr txBox="1"/>
+          <p:nvPr/>
+        </p:nvSpPr>
+        <p:spPr>
+          <a:xfrm>
+            <a:off x="0" y="0"/>
+            <a:ext cx="6858000" cy="3134078"/>
+          </a:xfrm>
+          <a:prstGeom prst="rect">
+            <a:avLst/>
+          </a:prstGeom>
+          <a:noFill/>
+        </p:spPr>
+        <p:txBody>
+          <a:bodyPr wrap="none">
+            <a:spAutoFit/>
+          </a:bodyPr>
+          <a:lstStyle/>
+          <a:p>
+            <a:pPr>
+              <a:defRPr sz="1000"/>
+            </a:pPr>
+            <a:r>
+              <a:t>L'entreprise SS&amp;C BLUE PRISM¹⁵ se positionne comme un acteur majeur dans le développement et la</a:t>
+            </a:r>
+            <a:br/>
+            <a:r>
+              <a:t>diffusion de la RPA dans le monde. Elle s'est distinguée en proposant à de nombreuses sociétés</a:t>
+            </a:r>
+            <a:br/>
+            <a:r>
+              <a:t>ses outils innovants tels que Blue Prism Cloud SaaS, une solution entièrement gérée et hébergée</a:t>
+            </a:r>
+            <a:br/>
+            <a:r>
+              <a:t>offrant un ensemble d'avantages sans inconvénients, et Robotic Operating Model (ROM), un modèle</a:t>
+            </a:r>
+            <a:br/>
+            <a:r>
+              <a:t>opérationnel éprouvé permettant de déployer, gérer et développer efficacement leur programme</a:t>
+            </a:r>
+            <a:br/>
+            <a:r>
+              <a:t>d'automatisation intelligente. Considérant la variété et la polyvalence des solutions proposées</a:t>
+            </a:r>
+            <a:br/>
+            <a:r>
+              <a:t>par cette entreprise, elle dessert une large gamme de clients¹⁶, englobant les secteurs</a:t>
+            </a:r>
+            <a:br/>
+            <a:r>
+              <a:t>bancaires, financiers, industriels, publics et des télécommunications. Pour preuve, l'une de ses</a:t>
+            </a:r>
+            <a:br/>
+            <a:r>
+              <a:t>ambitions majeures est de stimuler la transformation digitale des institutions bancaires et</a:t>
+            </a:r>
+            <a:br/>
+            <a:r>
+              <a:t>financières grâce à l'automatisation. Dans le secteur des télécommunications, elle envisage</a:t>
+            </a:r>
+            <a:br/>
+            <a:r>
+              <a:t>d'utiliser l'automatisation pour moderniser des modèles opérationnels parfois obsolètes, afin de</a:t>
+            </a:r>
+            <a:br/>
+            <a:r>
+              <a:t>fournir de nouveaux services omnicanals qui accompagneront l'avènement de la 5G et de l'Internet</a:t>
+            </a:r>
+            <a:br/>
+            <a:r>
+              <a:t>des Objets (IoT). Cette stratégie lui permettra de répondre aux attentes grandissantes des</a:t>
+            </a:r>
+            <a:br/>
+            <a:r>
+              <a:t>clients. Pour le secteur industriel, confronté à des défis tels que les conditions changeantes du</a:t>
+            </a:r>
+            <a:br/>
+            <a:r>
+              <a:t>marché, les pénuries de compétences et l'apparition de nouveaux concurrents, il apparait évident</a:t>
+            </a:r>
+            <a:br/>
+            <a:r>
+              <a:t>que l'heure est résolument au changement. C'est dans ce contexte que SS&amp;C BLUE PRISM envisage</a:t>
+            </a:r>
+            <a:br/>
+            <a:r>
+              <a:t>d'apporter sa contribution grâce à la RPA, permettant une transformation numérique soutenue et</a:t>
+            </a:r>
+            <a:br/>
+            <a:r>
+              <a:t>efficace. La jonction de cette vision aux capacités techniques reconnues de cette entreprise lui</a:t>
+            </a:r>
+            <a:br/>
+            <a:r>
+              <a:t>a ainsi permis de tisser un vaste réseau de partenaires à l’instar de microsoft, IBM ou encore</a:t>
+            </a:r>
+            <a:br/>
+            <a:r>
+              <a:t>google.</a:t>
+            </a:r>
+          </a:p>
+        </p:txBody>
+      </p:sp>
+      <p:sp>
+        <p:nvSpPr>
+          <p:cNvPr id="4" name="TextBox 3"/>
+          <p:cNvSpPr txBox="1"/>
+          <p:nvPr/>
+        </p:nvSpPr>
+        <p:spPr>
+          <a:xfrm>
+            <a:off x="138545" y="3134078"/>
+            <a:ext cx="6858000" cy="274320"/>
+          </a:xfrm>
+          <a:prstGeom prst="rect">
+            <a:avLst/>
+          </a:prstGeom>
+          <a:noFill/>
+        </p:spPr>
+        <p:txBody>
+          <a:bodyPr wrap="none">
+            <a:spAutoFit/>
+          </a:bodyPr>
+          <a:lstStyle/>
+          <a:p>
+            <a:pPr>
+              <a:defRPr sz="1100" b="1">
+                <a:solidFill>
+                  <a:schemeClr val="accent6"/>
+                </a:solidFill>
+              </a:defRPr>
+            </a:pPr>
+            <a:r>
+              <a:t>La construction de solutions RPA, l’exemple du géant Roumain UI PATH</a:t>
+            </a:r>
+          </a:p>
+        </p:txBody>
+      </p:sp>
+      <p:sp>
+        <p:nvSpPr>
+          <p:cNvPr id="5" name="TextBox 4"/>
+          <p:cNvSpPr txBox="1"/>
+          <p:nvPr/>
+        </p:nvSpPr>
+        <p:spPr>
+          <a:xfrm>
+            <a:off x="0" y="3408398"/>
+            <a:ext cx="6858000" cy="2881402"/>
+          </a:xfrm>
+          <a:prstGeom prst="rect">
+            <a:avLst/>
+          </a:prstGeom>
+          <a:noFill/>
+        </p:spPr>
+        <p:txBody>
+          <a:bodyPr wrap="none">
+            <a:spAutoFit/>
+          </a:bodyPr>
+          <a:lstStyle/>
+          <a:p>
+            <a:pPr>
+              <a:defRPr sz="1000"/>
+            </a:pPr>
+            <a:r>
+              <a:t>UIPath¹⁷, une société roumaine émergente, s'est taillé une place enviable sur le marché mondial</a:t>
+            </a:r>
+            <a:br/>
+            <a:r>
+              <a:t>des solutions RPA (Robotic Process Automation) et a ouvert une nouvelle voie pour l'Europe de</a:t>
+            </a:r>
+            <a:br/>
+            <a:r>
+              <a:t>l'Est en matière d'innovation technologique. Forte de sa plateforme avancée d'automatisation des</a:t>
+            </a:r>
+            <a:br/>
+            <a:r>
+              <a:t>processus, UIPath a fait preuve d'une audace créatrice qui a changé la donne dans le domaine de</a:t>
+            </a:r>
+            <a:br/>
+            <a:r>
+              <a:t>la RPA. Un des cas notables de l'application de la technologie de UIPath repose sur l’intégration</a:t>
+            </a:r>
+            <a:br/>
+            <a:r>
+              <a:t>par plus de 28 états américains¹⁸ de leurs solutions numériques. En effet, ces entités</a:t>
+            </a:r>
+            <a:br/>
+            <a:r>
+              <a:t>gouvernementales ont utilisé le logiciel de UIPath pour automatiser plusieurs de ses processus</a:t>
+            </a:r>
+            <a:br/>
+            <a:r>
+              <a:t>internes, résultant en une réduction significative du temps de travail et une amélioration de la</a:t>
+            </a:r>
+            <a:br/>
+            <a:r>
+              <a:t>précision dans l'exécution des tâches. De plus, la flexibilité de la solution de UIPath permet à</a:t>
+            </a:r>
+            <a:br/>
+            <a:r>
+              <a:t>ses utilisateurs de construire des robots personnalisés pour répondre à leurs besoins</a:t>
+            </a:r>
+            <a:br/>
+            <a:r>
+              <a:t>spécifiques, offrant ainsi une grande adaptabilité. Par exemple, la solution RPA de UIPath a été</a:t>
+            </a:r>
+            <a:br/>
+            <a:r>
+              <a:t>utilisée par la Deutsche Bank pour automatiser le traitement des factures, permettant à la banque</a:t>
+            </a:r>
+            <a:br/>
+            <a:r>
+              <a:t>de gagner en efficacité et de réduire les coûts. UIPath ne se repose cependant pas sur ses</a:t>
+            </a:r>
+            <a:br/>
+            <a:r>
+              <a:t>lauriers. En veillant à rester à la pointe des avancées technologiques, cette entreprise tend</a:t>
+            </a:r>
+            <a:br/>
+            <a:r>
+              <a:t>constamment à améliorer sa plateforme. Comme une preuve de l’innovation permanente de cette</a:t>
+            </a:r>
+            <a:br/>
+            <a:r>
+              <a:t>entreprise, elle a récemment introduit des capacités d'intelligence artificielle dans sa</a:t>
+            </a:r>
+            <a:br/>
+            <a:r>
+              <a:t>plateforme, permettant aux robots d'apprendre et de s'adapter en fonction des tâches qu'ils</a:t>
+            </a:r>
+            <a:br/>
+            <a:r>
+              <a:t>exécutent, offrant ainsi un niveau supérieur d'automatisation.</a:t>
+            </a:r>
+          </a:p>
+        </p:txBody>
+      </p:sp>
+      <p:sp>
+        <p:nvSpPr>
+          <p:cNvPr id="2" name="Title 1"/>
+          <p:cNvSpPr>
+            <a:spLocks noGrp="1"/>
+          </p:cNvSpPr>
+          <p:nvPr>
+            <p:ph type="title"/>
+          </p:nvPr>
+        </p:nvSpPr>
+        <p:spPr>
+          <a:xfrm>
+            <a:off x="138545" y="6304800"/>
+            <a:ext cx="6557819" cy="400000"/>
+          </a:xfrm>
+        </p:spPr>
+        <p:txBody>
+          <a:bodyPr/>
+          <a:lstStyle/>
+          <a:p>
+            <a:pPr>
+              <a:defRPr b="1" i="1">
+                <a:solidFill>
+                  <a:schemeClr val="bg1"/>
+                </a:solidFill>
+              </a:defRPr>
+            </a:pPr>
+            <a:r>
+              <a:t>Asie</a:t>
+            </a:r>
+          </a:p>
+        </p:txBody>
+      </p:sp>
+      <p:sp>
+        <p:nvSpPr>
+          <p:cNvPr id="6" name="TextBox 5"/>
+          <p:cNvSpPr txBox="1"/>
+          <p:nvPr/>
+        </p:nvSpPr>
+        <p:spPr>
+          <a:xfrm>
+            <a:off x="138545" y="6719800"/>
+            <a:ext cx="6858000" cy="274320"/>
+          </a:xfrm>
+          <a:prstGeom prst="rect">
+            <a:avLst/>
+          </a:prstGeom>
+          <a:noFill/>
+        </p:spPr>
+        <p:txBody>
+          <a:bodyPr wrap="none">
+            <a:spAutoFit/>
+          </a:bodyPr>
+          <a:lstStyle/>
+          <a:p>
+            <a:pPr>
+              <a:defRPr sz="1100" b="1">
+                <a:solidFill>
+                  <a:schemeClr val="accent6"/>
+                </a:solidFill>
+              </a:defRPr>
+            </a:pPr>
+            <a:r>
+              <a:t>La RPA un optimiser la mise à disposition des services de santé</a:t>
+            </a:r>
+          </a:p>
+        </p:txBody>
+      </p:sp>
+      <p:sp>
+        <p:nvSpPr>
+          <p:cNvPr id="7" name="TextBox 6"/>
+          <p:cNvSpPr txBox="1"/>
+          <p:nvPr/>
+        </p:nvSpPr>
+        <p:spPr>
+          <a:xfrm>
+            <a:off x="0" y="6994120"/>
+            <a:ext cx="6858000" cy="1909184"/>
+          </a:xfrm>
+          <a:prstGeom prst="rect">
+            <a:avLst/>
+          </a:prstGeom>
+          <a:noFill/>
+        </p:spPr>
+        <p:txBody>
+          <a:bodyPr wrap="none">
+            <a:spAutoFit/>
+          </a:bodyPr>
+          <a:lstStyle/>
+          <a:p>
+            <a:pPr>
+              <a:defRPr sz="1000"/>
+            </a:pPr>
+            <a:r>
+              <a:t>Max Healthcare¹⁹, l'un des principaux réseaux hospitaliers du nord de l'Inde, a adopté</a:t>
+            </a:r>
+            <a:br/>
+            <a:r>
+              <a:t>l'Automatisation des Processus Robotiques (RPA) pour gérer efficacement les vastes volumes de</a:t>
+            </a:r>
+            <a:br/>
+            <a:r>
+              <a:t>données des patients. Face à l'immensité des données à traiter et à la nécessité d'une précision</a:t>
+            </a:r>
+            <a:br/>
+            <a:r>
+              <a:t>maximale, cette entreprise a choisi d'implémenter la RPA, ce qui a conduit à une amélioration</a:t>
+            </a:r>
+            <a:br/>
+            <a:r>
+              <a:t>notable de son efficacité²⁰. Elle a d'abord procédé à l’automatisation du processus de</a:t>
+            </a:r>
+            <a:br/>
+            <a:r>
+              <a:t>réclamation manuel en utilisant un robot pour extraire les informations des clients et les</a:t>
+            </a:r>
+            <a:br/>
+            <a:r>
+              <a:t>intégrer dans une base de données. Ainsi, dans une première étape, un robot a été mis en place</a:t>
+            </a:r>
+            <a:br/>
+            <a:r>
+              <a:t>pour automatiser le processus de réclamation manuel. Ce robot extrait les informations relatives</a:t>
+            </a:r>
+            <a:br/>
+            <a:r>
+              <a:t>aux clients à partir de fichiers Outlook et PDF, puis ces données sont organisées au format CSV,</a:t>
+            </a:r>
+            <a:br/>
+            <a:r>
+              <a:t>pour justement être intégrées à une base de données. Grâce à cette stratégie, Max Healthcare a pu</a:t>
+            </a:r>
+            <a:br/>
+            <a:r>
+              <a:t>réduire de 75% le temps consacré au traitement des données, témoignant du potentiel</a:t>
+            </a:r>
+            <a:br/>
+            <a:r>
+              <a:t>transformationnel de la RPA dans le secteur de la santé.</a:t>
             </a:r>
           </a:p>
         </p:txBody>

</xml_diff>